<commit_message>
Updated the slides and added a resource slide to the deck.
</commit_message>
<xml_diff>
--- a/Semantic Kernel Overview.pptx
+++ b/Semantic Kernel Overview.pptx
@@ -5,7 +5,7 @@
     <p:sldMasterId id="2147483887" r:id="rId4"/>
   </p:sldMasterIdLst>
   <p:notesMasterIdLst>
-    <p:notesMasterId r:id="rId32"/>
+    <p:notesMasterId r:id="rId33"/>
   </p:notesMasterIdLst>
   <p:sldIdLst>
     <p:sldId id="256" r:id="rId5"/>
@@ -30,11 +30,12 @@
     <p:sldId id="2147480876" r:id="rId24"/>
     <p:sldId id="2147480875" r:id="rId25"/>
     <p:sldId id="2147480877" r:id="rId26"/>
-    <p:sldId id="2147480879" r:id="rId27"/>
-    <p:sldId id="2147480878" r:id="rId28"/>
-    <p:sldId id="270" r:id="rId29"/>
-    <p:sldId id="266" r:id="rId30"/>
-    <p:sldId id="2147480872" r:id="rId31"/>
+    <p:sldId id="2147480882" r:id="rId27"/>
+    <p:sldId id="2147480879" r:id="rId28"/>
+    <p:sldId id="2147480878" r:id="rId29"/>
+    <p:sldId id="270" r:id="rId30"/>
+    <p:sldId id="266" r:id="rId31"/>
+    <p:sldId id="2147480872" r:id="rId32"/>
   </p:sldIdLst>
   <p:sldSz cx="12192000" cy="6858000"/>
   <p:notesSz cx="6858000" cy="9144000"/>
@@ -172,6 +173,7 @@
             <p14:sldId id="2147480876"/>
             <p14:sldId id="2147480875"/>
             <p14:sldId id="2147480877"/>
+            <p14:sldId id="2147480882"/>
             <p14:sldId id="2147480879"/>
             <p14:sldId id="2147480878"/>
             <p14:sldId id="270"/>
@@ -195,7 +197,7 @@
 <file path=ppt/revisionInfo.xml><?xml version="1.0" encoding="utf-8"?>
 <p1510:revInfo xmlns:a="http://schemas.openxmlformats.org/drawingml/2006/main" xmlns:r="http://schemas.openxmlformats.org/officeDocument/2006/relationships" xmlns:p1510="http://schemas.microsoft.com/office/powerpoint/2015/10/main">
   <p1510:revLst>
-    <p1510:client id="{25843271-54D6-488B-A4C6-20911514E605}" v="12" dt="2025-08-19T04:46:35.630"/>
+    <p1510:client id="{25843271-54D6-488B-A4C6-20911514E605}" v="2" dt="2025-09-04T19:44:04.791"/>
   </p1510:revLst>
 </p1510:revInfo>
 </file>
@@ -205,7 +207,7 @@
   <pc:docChgLst>
     <pc:chgData name="Brian Spann" userId="df82fc38-8cec-41fc-a104-d1b358af507b" providerId="ADAL" clId="{9AA94F94-A085-4185-863A-1DA613957B12}"/>
     <pc:docChg chg="custSel addSld modSld modSection">
-      <pc:chgData name="Brian Spann" userId="df82fc38-8cec-41fc-a104-d1b358af507b" providerId="ADAL" clId="{9AA94F94-A085-4185-863A-1DA613957B12}" dt="2025-08-19T04:46:47.216" v="343" actId="20577"/>
+      <pc:chgData name="Brian Spann" userId="df82fc38-8cec-41fc-a104-d1b358af507b" providerId="ADAL" clId="{9AA94F94-A085-4185-863A-1DA613957B12}" dt="2025-09-04T19:45:05.653" v="2491" actId="20577"/>
       <pc:docMkLst>
         <pc:docMk/>
       </pc:docMkLst>
@@ -259,10 +261,38 @@
         </pc:sldMkLst>
       </pc:sldChg>
       <pc:sldChg chg="modNotesTx">
+        <pc:chgData name="Brian Spann" userId="df82fc38-8cec-41fc-a104-d1b358af507b" providerId="ADAL" clId="{9AA94F94-A085-4185-863A-1DA613957B12}" dt="2025-09-04T19:27:58.362" v="1153" actId="20577"/>
+        <pc:sldMkLst>
+          <pc:docMk/>
+          <pc:sldMk cId="293595821" sldId="2147480869"/>
+        </pc:sldMkLst>
+      </pc:sldChg>
+      <pc:sldChg chg="modNotesTx">
         <pc:chgData name="Brian Spann" userId="df82fc38-8cec-41fc-a104-d1b358af507b" providerId="ADAL" clId="{9AA94F94-A085-4185-863A-1DA613957B12}" dt="2025-08-19T02:58:57.171" v="10" actId="20577"/>
         <pc:sldMkLst>
           <pc:docMk/>
           <pc:sldMk cId="3388496941" sldId="2147480872"/>
+        </pc:sldMkLst>
+      </pc:sldChg>
+      <pc:sldChg chg="modNotesTx">
+        <pc:chgData name="Brian Spann" userId="df82fc38-8cec-41fc-a104-d1b358af507b" providerId="ADAL" clId="{9AA94F94-A085-4185-863A-1DA613957B12}" dt="2025-09-04T19:30:27.975" v="1349" actId="20577"/>
+        <pc:sldMkLst>
+          <pc:docMk/>
+          <pc:sldMk cId="3953580250" sldId="2147480873"/>
+        </pc:sldMkLst>
+      </pc:sldChg>
+      <pc:sldChg chg="modNotesTx">
+        <pc:chgData name="Brian Spann" userId="df82fc38-8cec-41fc-a104-d1b358af507b" providerId="ADAL" clId="{9AA94F94-A085-4185-863A-1DA613957B12}" dt="2025-09-04T19:31:21.848" v="1366" actId="20577"/>
+        <pc:sldMkLst>
+          <pc:docMk/>
+          <pc:sldMk cId="3113474759" sldId="2147480874"/>
+        </pc:sldMkLst>
+      </pc:sldChg>
+      <pc:sldChg chg="modNotesTx">
+        <pc:chgData name="Brian Spann" userId="df82fc38-8cec-41fc-a104-d1b358af507b" providerId="ADAL" clId="{9AA94F94-A085-4185-863A-1DA613957B12}" dt="2025-09-04T19:37:50.486" v="2130" actId="20577"/>
+        <pc:sldMkLst>
+          <pc:docMk/>
+          <pc:sldMk cId="294344151" sldId="2147480877"/>
         </pc:sldMkLst>
       </pc:sldChg>
       <pc:sldChg chg="modSp new mod">
@@ -285,6 +315,29 @@
             <pc:docMk/>
             <pc:sldMk cId="2706949202" sldId="2147480881"/>
             <ac:spMk id="3" creationId="{21C240F0-3F95-72D3-2A8A-02492EBC2D6F}"/>
+          </ac:spMkLst>
+        </pc:spChg>
+      </pc:sldChg>
+      <pc:sldChg chg="modSp new mod modNotesTx">
+        <pc:chgData name="Brian Spann" userId="df82fc38-8cec-41fc-a104-d1b358af507b" providerId="ADAL" clId="{9AA94F94-A085-4185-863A-1DA613957B12}" dt="2025-09-04T19:45:05.653" v="2491" actId="20577"/>
+        <pc:sldMkLst>
+          <pc:docMk/>
+          <pc:sldMk cId="1632649127" sldId="2147480882"/>
+        </pc:sldMkLst>
+        <pc:spChg chg="mod">
+          <ac:chgData name="Brian Spann" userId="df82fc38-8cec-41fc-a104-d1b358af507b" providerId="ADAL" clId="{9AA94F94-A085-4185-863A-1DA613957B12}" dt="2025-09-04T19:39:14.646" v="2142" actId="20577"/>
+          <ac:spMkLst>
+            <pc:docMk/>
+            <pc:sldMk cId="1632649127" sldId="2147480882"/>
+            <ac:spMk id="2" creationId="{4F68A945-E91D-885B-40B6-93D7A4A089C0}"/>
+          </ac:spMkLst>
+        </pc:spChg>
+        <pc:spChg chg="mod">
+          <ac:chgData name="Brian Spann" userId="df82fc38-8cec-41fc-a104-d1b358af507b" providerId="ADAL" clId="{9AA94F94-A085-4185-863A-1DA613957B12}" dt="2025-09-04T19:43:58.205" v="2254" actId="20577"/>
+          <ac:spMkLst>
+            <pc:docMk/>
+            <pc:sldMk cId="1632649127" sldId="2147480882"/>
+            <ac:spMk id="3" creationId="{C3AA3F13-AF57-351D-5723-83B428D4D573}"/>
           </ac:spMkLst>
         </pc:spChg>
       </pc:sldChg>
@@ -375,7 +428,7 @@
           <a:p>
             <a:fld id="{35F87A66-F6B0-4105-BFFC-32C647364C3C}" type="datetimeFigureOut">
               <a:rPr lang="en-US" smtClean="0"/>
-              <a:t>8/18/2025</a:t>
+              <a:t>9/4/2025</a:t>
             </a:fld>
             <a:endParaRPr lang="en-US"/>
           </a:p>
@@ -3160,6 +3213,56 @@
           <a:lstStyle/>
           <a:p>
             <a:r>
+              <a:rPr lang="en-US" sz="1200" b="0" i="0" kern="1200" dirty="0">
+                <a:solidFill>
+                  <a:schemeClr val="tx1"/>
+                </a:solidFill>
+                <a:effectLst/>
+                <a:latin typeface="+mn-lt"/>
+                <a:ea typeface="+mn-ea"/>
+                <a:cs typeface="+mn-cs"/>
+              </a:rPr>
+              <a:t>The field of AI is rapidly evolving, and the need for more sophisticated, collaborative, and flexible agent-based systems is growing. With this in mind, Semantic Kernel introduces a new multi-agent orchestration framework that enables developers to build, manage, and scale complex agent workflows with ease.</a:t>
+            </a:r>
+          </a:p>
+          <a:p>
+            <a:endParaRPr lang="en-US" sz="1200" b="0" i="0" kern="1200" dirty="0">
+              <a:solidFill>
+                <a:schemeClr val="tx1"/>
+              </a:solidFill>
+              <a:effectLst/>
+              <a:latin typeface="+mn-lt"/>
+              <a:ea typeface="+mn-ea"/>
+              <a:cs typeface="+mn-cs"/>
+            </a:endParaRPr>
+          </a:p>
+          <a:p>
+            <a:r>
+              <a:rPr lang="en-US" sz="1200" b="0" i="0" kern="1200" dirty="0">
+                <a:solidFill>
+                  <a:schemeClr val="tx1"/>
+                </a:solidFill>
+                <a:effectLst/>
+                <a:latin typeface="+mn-lt"/>
+                <a:ea typeface="+mn-ea"/>
+                <a:cs typeface="+mn-cs"/>
+              </a:rPr>
+              <a:t>Traditional single-agent systems are limited in their ability to handle complex, multi-faceted tasks. By orchestrating multiple agents, each with specialized skills or roles, we can create systems that are more robust, adaptive, and capable of solving real-world problems collaboratively. Multi-agent orchestration in Semantic Kernel provides a flexible foundation for building such systems, supporting a variety of coordination patterns.</a:t>
+            </a:r>
+          </a:p>
+          <a:p>
+            <a:endParaRPr lang="en-US" sz="1200" b="0" i="0" kern="1200" dirty="0">
+              <a:solidFill>
+                <a:schemeClr val="tx1"/>
+              </a:solidFill>
+              <a:effectLst/>
+              <a:latin typeface="+mn-lt"/>
+              <a:ea typeface="+mn-ea"/>
+              <a:cs typeface="+mn-cs"/>
+            </a:endParaRPr>
+          </a:p>
+          <a:p>
+            <a:r>
               <a:rPr lang="en-US" sz="1200" b="1" i="0" kern="1200" dirty="0">
                 <a:solidFill>
                   <a:schemeClr val="tx1"/>
@@ -3521,7 +3624,7 @@
                 <a:ea typeface="+mn-ea"/>
                 <a:cs typeface="+mn-cs"/>
               </a:rPr>
-              <a:t>In this approach, agents are arranged in a strict order, with each agent performing a specific function and passing its output to the next agent in the sequence.</a:t>
+              <a:t>In this approach, agents are arranged in a strict order or a pipeline, with each agent performing a specific function and passing its output to the next agent in the sequence.</a:t>
             </a:r>
           </a:p>
           <a:p>
@@ -3537,6 +3640,17 @@
               </a:rPr>
               <a:t>This pattern is ideal for scenarios where each stage of processing depends on the results of the previous stage. For example, you might start with a summarizer agent to condense input data, then pass the summary to a translator agent, and finally send the translated text to a QA agent for validation.</a:t>
             </a:r>
+          </a:p>
+          <a:p>
+            <a:endParaRPr lang="en-US" sz="1200" b="0" i="0" kern="1200" dirty="0">
+              <a:solidFill>
+                <a:schemeClr val="tx1"/>
+              </a:solidFill>
+              <a:effectLst/>
+              <a:latin typeface="+mn-lt"/>
+              <a:ea typeface="+mn-ea"/>
+              <a:cs typeface="+mn-cs"/>
+            </a:endParaRPr>
           </a:p>
           <a:p>
             <a:r>
@@ -3735,8 +3849,19 @@
                 <a:ea typeface="+mn-ea"/>
                 <a:cs typeface="+mn-cs"/>
               </a:rPr>
-              <a:t>In this approach, multiple agents work simultaneously, each handling a distinct aspect or subtask of the overall workflow.</a:t>
-            </a:r>
+              <a:t>In this approach, multiple agents work simultaneously, or in parallel, each handling a distinct aspect or subtask of the overall workflow.</a:t>
+            </a:r>
+          </a:p>
+          <a:p>
+            <a:endParaRPr lang="en-US" sz="1200" b="0" i="0" kern="1200" dirty="0">
+              <a:solidFill>
+                <a:schemeClr val="tx1"/>
+              </a:solidFill>
+              <a:effectLst/>
+              <a:latin typeface="+mn-lt"/>
+              <a:ea typeface="+mn-ea"/>
+              <a:cs typeface="+mn-cs"/>
+            </a:endParaRPr>
           </a:p>
           <a:p>
             <a:r>
@@ -4789,6 +4914,91 @@
           </a:p>
           <a:p>
             <a:r>
+              <a:rPr lang="en-US" sz="1200" b="0" i="0" kern="1200" dirty="0" err="1">
+                <a:solidFill>
+                  <a:schemeClr val="tx1"/>
+                </a:solidFill>
+                <a:effectLst/>
+                <a:latin typeface="+mn-lt"/>
+                <a:ea typeface="+mn-ea"/>
+                <a:cs typeface="+mn-cs"/>
+              </a:rPr>
+              <a:t>Magentic</a:t>
+            </a:r>
+            <a:r>
+              <a:rPr lang="en-US" sz="1200" b="0" i="0" kern="1200" dirty="0">
+                <a:solidFill>
+                  <a:schemeClr val="tx1"/>
+                </a:solidFill>
+                <a:effectLst/>
+                <a:latin typeface="+mn-lt"/>
+                <a:ea typeface="+mn-ea"/>
+                <a:cs typeface="+mn-cs"/>
+              </a:rPr>
+              <a:t> orchestration is designed based on the </a:t>
+            </a:r>
+            <a:r>
+              <a:rPr lang="en-US" sz="1200" b="0" i="0" kern="1200" dirty="0" err="1">
+                <a:solidFill>
+                  <a:schemeClr val="tx1"/>
+                </a:solidFill>
+                <a:effectLst/>
+                <a:latin typeface="+mn-lt"/>
+                <a:ea typeface="+mn-ea"/>
+                <a:cs typeface="+mn-cs"/>
+              </a:rPr>
+              <a:t>MagenticOne</a:t>
+            </a:r>
+            <a:r>
+              <a:rPr lang="en-US" sz="1200" b="0" i="0" kern="1200" dirty="0">
+                <a:solidFill>
+                  <a:schemeClr val="tx1"/>
+                </a:solidFill>
+                <a:effectLst/>
+                <a:latin typeface="+mn-lt"/>
+                <a:ea typeface="+mn-ea"/>
+                <a:cs typeface="+mn-cs"/>
+              </a:rPr>
+              <a:t> pattern invented by </a:t>
+            </a:r>
+            <a:r>
+              <a:rPr lang="en-US" sz="1200" b="0" i="0" kern="1200" dirty="0" err="1">
+                <a:solidFill>
+                  <a:schemeClr val="tx1"/>
+                </a:solidFill>
+                <a:effectLst/>
+                <a:latin typeface="+mn-lt"/>
+                <a:ea typeface="+mn-ea"/>
+                <a:cs typeface="+mn-cs"/>
+              </a:rPr>
+              <a:t>AutoGen</a:t>
+            </a:r>
+            <a:r>
+              <a:rPr lang="en-US" sz="1200" b="0" i="0" kern="1200" dirty="0">
+                <a:solidFill>
+                  <a:schemeClr val="tx1"/>
+                </a:solidFill>
+                <a:effectLst/>
+                <a:latin typeface="+mn-lt"/>
+                <a:ea typeface="+mn-ea"/>
+                <a:cs typeface="+mn-cs"/>
+              </a:rPr>
+              <a:t>. It is a flexible, general-purpose multi-agent pattern designed for complex, open-ended tasks that require dynamic collaboration.</a:t>
+            </a:r>
+          </a:p>
+          <a:p>
+            <a:endParaRPr lang="en-US" sz="1200" b="0" i="0" kern="1200" dirty="0">
+              <a:solidFill>
+                <a:schemeClr val="tx1"/>
+              </a:solidFill>
+              <a:effectLst/>
+              <a:latin typeface="+mn-lt"/>
+              <a:ea typeface="+mn-ea"/>
+              <a:cs typeface="+mn-cs"/>
+            </a:endParaRPr>
+          </a:p>
+          <a:p>
+            <a:r>
               <a:rPr lang="en-US" sz="1200" b="0" i="0" kern="1200" dirty="0">
                 <a:solidFill>
                   <a:schemeClr val="tx1"/>
@@ -4896,6 +5106,26 @@
           </a:p>
           <a:p>
             <a:endParaRPr lang="en-US" dirty="0"/>
+          </a:p>
+          <a:p>
+            <a:r>
+              <a:rPr lang="en-US" dirty="0"/>
+              <a:t>Use case example:</a:t>
+            </a:r>
+          </a:p>
+          <a:p>
+            <a:r>
+              <a:rPr lang="en-US" dirty="0"/>
+              <a:t>A user requests a comprehensive report comparing the energy efficiency and CO2 emissions of different machine learning models. The </a:t>
+            </a:r>
+            <a:r>
+              <a:rPr lang="en-US" dirty="0" err="1"/>
+              <a:t>Magentic</a:t>
+            </a:r>
+            <a:r>
+              <a:rPr lang="en-US" dirty="0"/>
+              <a:t> manager first assigns a research agent to gather relevant data, then delegates analysis and computation to a coder agent. The manager coordinates multiple rounds of research and computation, aggregates the findings, and produces a detailed structured report as the final output.</a:t>
+            </a:r>
           </a:p>
         </p:txBody>
       </p:sp>
@@ -4980,250 +5210,13 @@
           <a:lstStyle/>
           <a:p>
             <a:r>
-              <a:rPr lang="en-US" sz="1200" b="1" i="0" kern="1200" dirty="0">
-                <a:solidFill>
-                  <a:schemeClr val="tx1"/>
-                </a:solidFill>
-                <a:effectLst/>
-                <a:latin typeface="+mn-lt"/>
-                <a:ea typeface="+mn-ea"/>
-                <a:cs typeface="+mn-cs"/>
-              </a:rPr>
-              <a:t>Agent orchestration in Semantic Kernel is powered by several key components that ensure flexibility, reliability, and scalability in complex AI workflows.</a:t>
-            </a:r>
-            <a:endParaRPr lang="en-US" sz="1200" b="0" i="0" kern="1200" dirty="0">
-              <a:solidFill>
-                <a:schemeClr val="tx1"/>
-              </a:solidFill>
-              <a:effectLst/>
-              <a:latin typeface="+mn-lt"/>
-              <a:ea typeface="+mn-ea"/>
-              <a:cs typeface="+mn-cs"/>
-            </a:endParaRPr>
-          </a:p>
-          <a:p>
-            <a:endParaRPr lang="en-US" sz="1200" b="1" i="0" kern="1200" dirty="0">
-              <a:solidFill>
-                <a:schemeClr val="tx1"/>
-              </a:solidFill>
-              <a:effectLst/>
-              <a:latin typeface="+mn-lt"/>
-              <a:ea typeface="+mn-ea"/>
-              <a:cs typeface="+mn-cs"/>
-            </a:endParaRPr>
-          </a:p>
-          <a:p>
-            <a:r>
-              <a:rPr lang="en-US" sz="1200" b="1" i="0" kern="1200" dirty="0">
-                <a:solidFill>
-                  <a:schemeClr val="tx1"/>
-                </a:solidFill>
-                <a:effectLst/>
-                <a:latin typeface="+mn-lt"/>
-                <a:ea typeface="+mn-ea"/>
-                <a:cs typeface="+mn-cs"/>
-              </a:rPr>
-              <a:t>Runtime:</a:t>
-            </a:r>
-            <a:r>
-              <a:rPr lang="en-US" sz="1200" b="0" i="0" kern="1200" dirty="0">
-                <a:solidFill>
-                  <a:schemeClr val="tx1"/>
-                </a:solidFill>
-                <a:effectLst/>
-                <a:latin typeface="+mn-lt"/>
-                <a:ea typeface="+mn-ea"/>
-                <a:cs typeface="+mn-cs"/>
-              </a:rPr>
-              <a:t> The runtime is responsible for managing the execution of orchestrations, handling the lifecycle of agents, and routing messages between agents and other system components. This enables seamless coordination and communication throughout the orchestration process.</a:t>
-            </a:r>
-          </a:p>
-          <a:p>
-            <a:endParaRPr lang="en-US" sz="1200" b="1" i="0" kern="1200" dirty="0">
-              <a:solidFill>
-                <a:schemeClr val="tx1"/>
-              </a:solidFill>
-              <a:effectLst/>
-              <a:latin typeface="+mn-lt"/>
-              <a:ea typeface="+mn-ea"/>
-              <a:cs typeface="+mn-cs"/>
-            </a:endParaRPr>
-          </a:p>
-          <a:p>
-            <a:r>
-              <a:rPr lang="en-US" sz="1200" b="1" i="0" kern="1200" dirty="0">
-                <a:solidFill>
-                  <a:schemeClr val="tx1"/>
-                </a:solidFill>
-                <a:effectLst/>
-                <a:latin typeface="+mn-lt"/>
-                <a:ea typeface="+mn-ea"/>
-                <a:cs typeface="+mn-cs"/>
-              </a:rPr>
-              <a:t>Async &amp; Timeout:</a:t>
-            </a:r>
-            <a:r>
-              <a:rPr lang="en-US" sz="1200" b="0" i="0" kern="1200" dirty="0">
-                <a:solidFill>
-                  <a:schemeClr val="tx1"/>
-                </a:solidFill>
-                <a:effectLst/>
-                <a:latin typeface="+mn-lt"/>
-                <a:ea typeface="+mn-ea"/>
-                <a:cs typeface="+mn-cs"/>
-              </a:rPr>
-              <a:t> Orchestrations can run asynchronously in the background, allowing for non-blocking execution and improved system responsiveness. Timeout mechanisms ensure that long-running or stalled orchestrations can be gracefully terminated, preventing resource exhaustion and maintaining system stability.</a:t>
-            </a:r>
-          </a:p>
-          <a:p>
-            <a:endParaRPr lang="en-US" sz="1200" b="1" i="0" kern="1200" dirty="0">
-              <a:solidFill>
-                <a:schemeClr val="tx1"/>
-              </a:solidFill>
-              <a:effectLst/>
-              <a:latin typeface="+mn-lt"/>
-              <a:ea typeface="+mn-ea"/>
-              <a:cs typeface="+mn-cs"/>
-            </a:endParaRPr>
-          </a:p>
-          <a:p>
-            <a:r>
-              <a:rPr lang="en-US" sz="1200" b="1" i="0" kern="1200" dirty="0">
-                <a:solidFill>
-                  <a:schemeClr val="tx1"/>
-                </a:solidFill>
-                <a:effectLst/>
-                <a:latin typeface="+mn-lt"/>
-                <a:ea typeface="+mn-ea"/>
-                <a:cs typeface="+mn-cs"/>
-              </a:rPr>
-              <a:t>Human-in-the-Loop:</a:t>
-            </a:r>
-            <a:r>
-              <a:rPr lang="en-US" sz="1200" b="0" i="0" kern="1200" dirty="0">
-                <a:solidFill>
-                  <a:schemeClr val="tx1"/>
-                </a:solidFill>
-                <a:effectLst/>
-                <a:latin typeface="+mn-lt"/>
-                <a:ea typeface="+mn-ea"/>
-                <a:cs typeface="+mn-cs"/>
-              </a:rPr>
-              <a:t> Semantic Kernel supports manual intervention during orchestration via callbacks. This is especially important in scenarios like handoff or group chat, where human input may be required for approvals, decision-making, or nuanced judgment. Human-in-the-loop capabilities enhance the reliability and accountability of automated workflows.</a:t>
-            </a:r>
-          </a:p>
-          <a:p>
-            <a:endParaRPr lang="en-US" sz="1200" b="1" i="0" kern="1200" dirty="0">
-              <a:solidFill>
-                <a:schemeClr val="tx1"/>
-              </a:solidFill>
-              <a:effectLst/>
-              <a:latin typeface="+mn-lt"/>
-              <a:ea typeface="+mn-ea"/>
-              <a:cs typeface="+mn-cs"/>
-            </a:endParaRPr>
-          </a:p>
-          <a:p>
-            <a:r>
-              <a:rPr lang="en-US" sz="1200" b="1" i="0" kern="1200" dirty="0">
-                <a:solidFill>
-                  <a:schemeClr val="tx1"/>
-                </a:solidFill>
-                <a:effectLst/>
-                <a:latin typeface="+mn-lt"/>
-                <a:ea typeface="+mn-ea"/>
-                <a:cs typeface="+mn-cs"/>
-              </a:rPr>
-              <a:t>Structured Data:</a:t>
-            </a:r>
-            <a:r>
-              <a:rPr lang="en-US" sz="1200" b="0" i="0" kern="1200" dirty="0">
-                <a:solidFill>
-                  <a:schemeClr val="tx1"/>
-                </a:solidFill>
-                <a:effectLst/>
-                <a:latin typeface="+mn-lt"/>
-                <a:ea typeface="+mn-ea"/>
-                <a:cs typeface="+mn-cs"/>
-              </a:rPr>
-              <a:t> Typed models are used to pass data into and out of orchestrations, ensuring that information is exchanged in a clean, consistent, and type-safe manner. This promotes maintainability and reduces errors in complex workflows.</a:t>
-            </a:r>
-          </a:p>
-          <a:p>
-            <a:endParaRPr lang="en-US" sz="1200" b="1" i="0" kern="1200" dirty="0">
-              <a:solidFill>
-                <a:schemeClr val="tx1"/>
-              </a:solidFill>
-              <a:effectLst/>
-              <a:latin typeface="+mn-lt"/>
-              <a:ea typeface="+mn-ea"/>
-              <a:cs typeface="+mn-cs"/>
-            </a:endParaRPr>
-          </a:p>
-          <a:p>
-            <a:r>
-              <a:rPr lang="en-US" sz="1200" b="1" i="0" kern="1200" dirty="0">
-                <a:solidFill>
-                  <a:schemeClr val="tx1"/>
-                </a:solidFill>
-                <a:effectLst/>
-                <a:latin typeface="+mn-lt"/>
-                <a:ea typeface="+mn-ea"/>
-                <a:cs typeface="+mn-cs"/>
-              </a:rPr>
-              <a:t>Cancellation:</a:t>
-            </a:r>
-            <a:r>
-              <a:rPr lang="en-US" sz="1200" b="0" i="0" kern="1200" dirty="0">
-                <a:solidFill>
-                  <a:schemeClr val="tx1"/>
-                </a:solidFill>
-                <a:effectLst/>
-                <a:latin typeface="+mn-lt"/>
-                <a:ea typeface="+mn-ea"/>
-                <a:cs typeface="+mn-cs"/>
-              </a:rPr>
-              <a:t> The orchestration framework allows for cancellation of flows, enabling users or systems to halt processes when necessary. Even after cancellation, the runtime can continue, and in-progress steps may still finish, ensuring graceful degradation and robust error handling.</a:t>
-            </a:r>
-          </a:p>
-          <a:p>
-            <a:endParaRPr lang="en-US" sz="1200" b="1" i="0" kern="1200" dirty="0">
-              <a:solidFill>
-                <a:schemeClr val="tx1"/>
-              </a:solidFill>
-              <a:effectLst/>
-              <a:latin typeface="+mn-lt"/>
-              <a:ea typeface="+mn-ea"/>
-              <a:cs typeface="+mn-cs"/>
-            </a:endParaRPr>
-          </a:p>
-          <a:p>
-            <a:r>
-              <a:rPr lang="en-US" sz="1200" b="1" i="0" kern="1200" dirty="0">
-                <a:solidFill>
-                  <a:schemeClr val="tx1"/>
-                </a:solidFill>
-                <a:effectLst/>
-                <a:latin typeface="+mn-lt"/>
-                <a:ea typeface="+mn-ea"/>
-                <a:cs typeface="+mn-cs"/>
-              </a:rPr>
-              <a:t>Summary:</a:t>
-            </a:r>
-            <a:r>
-              <a:rPr lang="en-US" sz="1200" b="0" i="0" kern="1200" dirty="0">
-                <a:solidFill>
-                  <a:schemeClr val="tx1"/>
-                </a:solidFill>
-                <a:effectLst/>
-                <a:latin typeface="+mn-lt"/>
-                <a:ea typeface="+mn-ea"/>
-                <a:cs typeface="+mn-cs"/>
-              </a:rPr>
-              <a:t> These components collectively empower developers to build sophisticated, resilient, and human-centric AI solutions with Semantic Kernel, supporting a wide range of orchestration patterns and enterprise requirements.</a:t>
-            </a:r>
-          </a:p>
-          <a:p>
+              <a:rPr lang="en-US" dirty="0"/>
+              <a:t>To help you get started, Semantic Kernel provides a set of samples demonstrating each orchestration pattern. These samples showcase how to define agents, configure orchestrations, and run collaborative </a:t>
+            </a:r>
+            <a:r>
+              <a:rPr lang="en-US"/>
+              <a:t>workflows.</a:t>
+            </a:r>
             <a:endParaRPr lang="en-US" dirty="0"/>
           </a:p>
         </p:txBody>
@@ -5254,7 +5247,7 @@
     </p:spTree>
     <p:extLst>
       <p:ext uri="{BB962C8B-B14F-4D97-AF65-F5344CB8AC3E}">
-        <p14:creationId xmlns:p14="http://schemas.microsoft.com/office/powerpoint/2010/main" val="3421527683"/>
+        <p14:creationId xmlns:p14="http://schemas.microsoft.com/office/powerpoint/2010/main" val="1376791841"/>
       </p:ext>
     </p:extLst>
   </p:cSld>
@@ -5308,6 +5301,251 @@
           <a:bodyPr/>
           <a:lstStyle/>
           <a:p>
+            <a:r>
+              <a:rPr lang="en-US" sz="1200" b="1" i="0" kern="1200" dirty="0">
+                <a:solidFill>
+                  <a:schemeClr val="tx1"/>
+                </a:solidFill>
+                <a:effectLst/>
+                <a:latin typeface="+mn-lt"/>
+                <a:ea typeface="+mn-ea"/>
+                <a:cs typeface="+mn-cs"/>
+              </a:rPr>
+              <a:t>Agent orchestration in Semantic Kernel is powered by several key components that ensure flexibility, reliability, and scalability in complex AI workflows.</a:t>
+            </a:r>
+            <a:endParaRPr lang="en-US" sz="1200" b="0" i="0" kern="1200" dirty="0">
+              <a:solidFill>
+                <a:schemeClr val="tx1"/>
+              </a:solidFill>
+              <a:effectLst/>
+              <a:latin typeface="+mn-lt"/>
+              <a:ea typeface="+mn-ea"/>
+              <a:cs typeface="+mn-cs"/>
+            </a:endParaRPr>
+          </a:p>
+          <a:p>
+            <a:endParaRPr lang="en-US" sz="1200" b="1" i="0" kern="1200" dirty="0">
+              <a:solidFill>
+                <a:schemeClr val="tx1"/>
+              </a:solidFill>
+              <a:effectLst/>
+              <a:latin typeface="+mn-lt"/>
+              <a:ea typeface="+mn-ea"/>
+              <a:cs typeface="+mn-cs"/>
+            </a:endParaRPr>
+          </a:p>
+          <a:p>
+            <a:r>
+              <a:rPr lang="en-US" sz="1200" b="1" i="0" kern="1200" dirty="0">
+                <a:solidFill>
+                  <a:schemeClr val="tx1"/>
+                </a:solidFill>
+                <a:effectLst/>
+                <a:latin typeface="+mn-lt"/>
+                <a:ea typeface="+mn-ea"/>
+                <a:cs typeface="+mn-cs"/>
+              </a:rPr>
+              <a:t>Runtime:</a:t>
+            </a:r>
+            <a:r>
+              <a:rPr lang="en-US" sz="1200" b="0" i="0" kern="1200" dirty="0">
+                <a:solidFill>
+                  <a:schemeClr val="tx1"/>
+                </a:solidFill>
+                <a:effectLst/>
+                <a:latin typeface="+mn-lt"/>
+                <a:ea typeface="+mn-ea"/>
+                <a:cs typeface="+mn-cs"/>
+              </a:rPr>
+              <a:t> The runtime is responsible for managing the execution of orchestrations, handling the lifecycle of agents, and routing messages between agents and other system components. This enables seamless coordination and communication throughout the orchestration process.</a:t>
+            </a:r>
+          </a:p>
+          <a:p>
+            <a:endParaRPr lang="en-US" sz="1200" b="1" i="0" kern="1200" dirty="0">
+              <a:solidFill>
+                <a:schemeClr val="tx1"/>
+              </a:solidFill>
+              <a:effectLst/>
+              <a:latin typeface="+mn-lt"/>
+              <a:ea typeface="+mn-ea"/>
+              <a:cs typeface="+mn-cs"/>
+            </a:endParaRPr>
+          </a:p>
+          <a:p>
+            <a:r>
+              <a:rPr lang="en-US" sz="1200" b="1" i="0" kern="1200" dirty="0">
+                <a:solidFill>
+                  <a:schemeClr val="tx1"/>
+                </a:solidFill>
+                <a:effectLst/>
+                <a:latin typeface="+mn-lt"/>
+                <a:ea typeface="+mn-ea"/>
+                <a:cs typeface="+mn-cs"/>
+              </a:rPr>
+              <a:t>Async &amp; Timeout:</a:t>
+            </a:r>
+            <a:r>
+              <a:rPr lang="en-US" sz="1200" b="0" i="0" kern="1200" dirty="0">
+                <a:solidFill>
+                  <a:schemeClr val="tx1"/>
+                </a:solidFill>
+                <a:effectLst/>
+                <a:latin typeface="+mn-lt"/>
+                <a:ea typeface="+mn-ea"/>
+                <a:cs typeface="+mn-cs"/>
+              </a:rPr>
+              <a:t> Orchestrations can run asynchronously in the background, allowing for non-blocking execution and improved system responsiveness. Timeout mechanisms ensure that long-running or stalled orchestrations can be gracefully terminated, preventing resource exhaustion and maintaining system stability.</a:t>
+            </a:r>
+          </a:p>
+          <a:p>
+            <a:endParaRPr lang="en-US" sz="1200" b="1" i="0" kern="1200" dirty="0">
+              <a:solidFill>
+                <a:schemeClr val="tx1"/>
+              </a:solidFill>
+              <a:effectLst/>
+              <a:latin typeface="+mn-lt"/>
+              <a:ea typeface="+mn-ea"/>
+              <a:cs typeface="+mn-cs"/>
+            </a:endParaRPr>
+          </a:p>
+          <a:p>
+            <a:r>
+              <a:rPr lang="en-US" sz="1200" b="1" i="0" kern="1200" dirty="0">
+                <a:solidFill>
+                  <a:schemeClr val="tx1"/>
+                </a:solidFill>
+                <a:effectLst/>
+                <a:latin typeface="+mn-lt"/>
+                <a:ea typeface="+mn-ea"/>
+                <a:cs typeface="+mn-cs"/>
+              </a:rPr>
+              <a:t>Human-in-the-Loop:</a:t>
+            </a:r>
+            <a:r>
+              <a:rPr lang="en-US" sz="1200" b="0" i="0" kern="1200" dirty="0">
+                <a:solidFill>
+                  <a:schemeClr val="tx1"/>
+                </a:solidFill>
+                <a:effectLst/>
+                <a:latin typeface="+mn-lt"/>
+                <a:ea typeface="+mn-ea"/>
+                <a:cs typeface="+mn-cs"/>
+              </a:rPr>
+              <a:t> Semantic Kernel supports manual intervention during orchestration via callbacks. This is especially important in scenarios like handoff or group chat, where human input may be required for approvals, decision-making, or nuanced judgment. Human-in-the-loop capabilities enhance the reliability and accountability of automated workflows.</a:t>
+            </a:r>
+          </a:p>
+          <a:p>
+            <a:endParaRPr lang="en-US" sz="1200" b="1" i="0" kern="1200" dirty="0">
+              <a:solidFill>
+                <a:schemeClr val="tx1"/>
+              </a:solidFill>
+              <a:effectLst/>
+              <a:latin typeface="+mn-lt"/>
+              <a:ea typeface="+mn-ea"/>
+              <a:cs typeface="+mn-cs"/>
+            </a:endParaRPr>
+          </a:p>
+          <a:p>
+            <a:r>
+              <a:rPr lang="en-US" sz="1200" b="1" i="0" kern="1200" dirty="0">
+                <a:solidFill>
+                  <a:schemeClr val="tx1"/>
+                </a:solidFill>
+                <a:effectLst/>
+                <a:latin typeface="+mn-lt"/>
+                <a:ea typeface="+mn-ea"/>
+                <a:cs typeface="+mn-cs"/>
+              </a:rPr>
+              <a:t>Structured Data:</a:t>
+            </a:r>
+            <a:r>
+              <a:rPr lang="en-US" sz="1200" b="0" i="0" kern="1200" dirty="0">
+                <a:solidFill>
+                  <a:schemeClr val="tx1"/>
+                </a:solidFill>
+                <a:effectLst/>
+                <a:latin typeface="+mn-lt"/>
+                <a:ea typeface="+mn-ea"/>
+                <a:cs typeface="+mn-cs"/>
+              </a:rPr>
+              <a:t> Typed models are used to pass data into and out of orchestrations, ensuring that information is exchanged in a clean, consistent, and type-safe manner. This promotes maintainability and reduces errors in complex workflows.</a:t>
+            </a:r>
+          </a:p>
+          <a:p>
+            <a:endParaRPr lang="en-US" sz="1200" b="1" i="0" kern="1200" dirty="0">
+              <a:solidFill>
+                <a:schemeClr val="tx1"/>
+              </a:solidFill>
+              <a:effectLst/>
+              <a:latin typeface="+mn-lt"/>
+              <a:ea typeface="+mn-ea"/>
+              <a:cs typeface="+mn-cs"/>
+            </a:endParaRPr>
+          </a:p>
+          <a:p>
+            <a:r>
+              <a:rPr lang="en-US" sz="1200" b="1" i="0" kern="1200" dirty="0">
+                <a:solidFill>
+                  <a:schemeClr val="tx1"/>
+                </a:solidFill>
+                <a:effectLst/>
+                <a:latin typeface="+mn-lt"/>
+                <a:ea typeface="+mn-ea"/>
+                <a:cs typeface="+mn-cs"/>
+              </a:rPr>
+              <a:t>Cancellation:</a:t>
+            </a:r>
+            <a:r>
+              <a:rPr lang="en-US" sz="1200" b="0" i="0" kern="1200" dirty="0">
+                <a:solidFill>
+                  <a:schemeClr val="tx1"/>
+                </a:solidFill>
+                <a:effectLst/>
+                <a:latin typeface="+mn-lt"/>
+                <a:ea typeface="+mn-ea"/>
+                <a:cs typeface="+mn-cs"/>
+              </a:rPr>
+              <a:t> The orchestration framework allows for cancellation of flows, enabling users or systems to halt processes when necessary. Even after cancellation, the runtime can continue, and in-progress steps may still finish, ensuring graceful degradation and robust error handling.</a:t>
+            </a:r>
+          </a:p>
+          <a:p>
+            <a:endParaRPr lang="en-US" sz="1200" b="1" i="0" kern="1200" dirty="0">
+              <a:solidFill>
+                <a:schemeClr val="tx1"/>
+              </a:solidFill>
+              <a:effectLst/>
+              <a:latin typeface="+mn-lt"/>
+              <a:ea typeface="+mn-ea"/>
+              <a:cs typeface="+mn-cs"/>
+            </a:endParaRPr>
+          </a:p>
+          <a:p>
+            <a:r>
+              <a:rPr lang="en-US" sz="1200" b="1" i="0" kern="1200" dirty="0">
+                <a:solidFill>
+                  <a:schemeClr val="tx1"/>
+                </a:solidFill>
+                <a:effectLst/>
+                <a:latin typeface="+mn-lt"/>
+                <a:ea typeface="+mn-ea"/>
+                <a:cs typeface="+mn-cs"/>
+              </a:rPr>
+              <a:t>Summary:</a:t>
+            </a:r>
+            <a:r>
+              <a:rPr lang="en-US" sz="1200" b="0" i="0" kern="1200" dirty="0">
+                <a:solidFill>
+                  <a:schemeClr val="tx1"/>
+                </a:solidFill>
+                <a:effectLst/>
+                <a:latin typeface="+mn-lt"/>
+                <a:ea typeface="+mn-ea"/>
+                <a:cs typeface="+mn-cs"/>
+              </a:rPr>
+              <a:t> These components collectively empower developers to build sophisticated, resilient, and human-centric AI solutions with Semantic Kernel, supporting a wide range of orchestration patterns and enterprise requirements.</a:t>
+            </a:r>
+          </a:p>
+          <a:p>
             <a:endParaRPr lang="en-US" dirty="0"/>
           </a:p>
         </p:txBody>
@@ -5329,7 +5567,7 @@
           <a:p>
             <a:fld id="{9DB6582F-CBB7-4C9A-87B6-76D328371F43}" type="slidenum">
               <a:rPr lang="en-US" smtClean="0"/>
-              <a:t>25</a:t>
+              <a:t>24</a:t>
             </a:fld>
             <a:endParaRPr lang="en-US"/>
           </a:p>
@@ -5338,7 +5576,7 @@
     </p:spTree>
     <p:extLst>
       <p:ext uri="{BB962C8B-B14F-4D97-AF65-F5344CB8AC3E}">
-        <p14:creationId xmlns:p14="http://schemas.microsoft.com/office/powerpoint/2010/main" val="57690925"/>
+        <p14:creationId xmlns:p14="http://schemas.microsoft.com/office/powerpoint/2010/main" val="3421527683"/>
       </p:ext>
     </p:extLst>
   </p:cSld>
@@ -5392,307 +5630,6 @@
           <a:bodyPr/>
           <a:lstStyle/>
           <a:p>
-            <a:r>
-              <a:rPr lang="en-US" sz="1200" b="1" i="0" kern="1200" dirty="0">
-                <a:solidFill>
-                  <a:schemeClr val="tx1"/>
-                </a:solidFill>
-                <a:effectLst/>
-                <a:latin typeface="+mn-lt"/>
-                <a:ea typeface="+mn-ea"/>
-                <a:cs typeface="+mn-cs"/>
-              </a:rPr>
-              <a:t>The Process Framework in Semantic Kernel introduces a new paradigm for orchestrating complex, event-driven workflows.</a:t>
-            </a:r>
-            <a:endParaRPr lang="en-US" sz="1200" b="0" i="0" kern="1200" dirty="0">
-              <a:solidFill>
-                <a:schemeClr val="tx1"/>
-              </a:solidFill>
-              <a:effectLst/>
-              <a:latin typeface="+mn-lt"/>
-              <a:ea typeface="+mn-ea"/>
-              <a:cs typeface="+mn-cs"/>
-            </a:endParaRPr>
-          </a:p>
-          <a:p>
-            <a:endParaRPr lang="en-US" sz="1200" b="0" i="0" kern="1200" dirty="0">
-              <a:solidFill>
-                <a:schemeClr val="tx1"/>
-              </a:solidFill>
-              <a:effectLst/>
-              <a:latin typeface="+mn-lt"/>
-              <a:ea typeface="+mn-ea"/>
-              <a:cs typeface="+mn-cs"/>
-            </a:endParaRPr>
-          </a:p>
-          <a:p>
-            <a:r>
-              <a:rPr lang="en-US" sz="1200" b="0" i="0" kern="1200" dirty="0">
-                <a:solidFill>
-                  <a:schemeClr val="tx1"/>
-                </a:solidFill>
-                <a:effectLst/>
-                <a:latin typeface="+mn-lt"/>
-                <a:ea typeface="+mn-ea"/>
-                <a:cs typeface="+mn-cs"/>
-              </a:rPr>
-              <a:t>Unlike the agent framework, which is primarily focused on conversational and LLM-driven interactions, the process framework is designed for structured, auditable automation—ideal for business processes, approvals, and multi-step tasks.</a:t>
-            </a:r>
-          </a:p>
-          <a:p>
-            <a:endParaRPr lang="en-US" sz="1200" b="1" i="0" kern="1200" dirty="0">
-              <a:solidFill>
-                <a:schemeClr val="tx1"/>
-              </a:solidFill>
-              <a:effectLst/>
-              <a:latin typeface="+mn-lt"/>
-              <a:ea typeface="+mn-ea"/>
-              <a:cs typeface="+mn-cs"/>
-            </a:endParaRPr>
-          </a:p>
-          <a:p>
-            <a:r>
-              <a:rPr lang="en-US" sz="1200" b="1" i="0" kern="1200" dirty="0">
-                <a:solidFill>
-                  <a:schemeClr val="tx1"/>
-                </a:solidFill>
-                <a:effectLst/>
-                <a:latin typeface="+mn-lt"/>
-                <a:ea typeface="+mn-ea"/>
-                <a:cs typeface="+mn-cs"/>
-              </a:rPr>
-              <a:t>Key Concepts:</a:t>
-            </a:r>
-            <a:endParaRPr lang="en-US" sz="1200" b="0" i="0" kern="1200" dirty="0">
-              <a:solidFill>
-                <a:schemeClr val="tx1"/>
-              </a:solidFill>
-              <a:effectLst/>
-              <a:latin typeface="+mn-lt"/>
-              <a:ea typeface="+mn-ea"/>
-              <a:cs typeface="+mn-cs"/>
-            </a:endParaRPr>
-          </a:p>
-          <a:p>
-            <a:pPr lvl="1"/>
-            <a:r>
-              <a:rPr lang="en-US" sz="1200" b="1" i="0" kern="1200" dirty="0">
-                <a:solidFill>
-                  <a:schemeClr val="tx1"/>
-                </a:solidFill>
-                <a:effectLst/>
-                <a:latin typeface="+mn-lt"/>
-                <a:ea typeface="+mn-ea"/>
-                <a:cs typeface="+mn-cs"/>
-              </a:rPr>
-              <a:t>Process:</a:t>
-            </a:r>
-            <a:r>
-              <a:rPr lang="en-US" sz="1200" b="0" i="0" kern="1200" dirty="0">
-                <a:solidFill>
-                  <a:schemeClr val="tx1"/>
-                </a:solidFill>
-                <a:effectLst/>
-                <a:latin typeface="+mn-lt"/>
-                <a:ea typeface="+mn-ea"/>
-                <a:cs typeface="+mn-cs"/>
-              </a:rPr>
-              <a:t> Acts as the orchestrator, managing a sequence of modular steps. Each process is reusable and can be triggered by events, making it highly adaptable to changing business requirements.</a:t>
-            </a:r>
-          </a:p>
-          <a:p>
-            <a:pPr lvl="1"/>
-            <a:r>
-              <a:rPr lang="en-US" sz="1200" b="1" i="0" kern="1200" dirty="0">
-                <a:solidFill>
-                  <a:schemeClr val="tx1"/>
-                </a:solidFill>
-                <a:effectLst/>
-                <a:latin typeface="+mn-lt"/>
-                <a:ea typeface="+mn-ea"/>
-                <a:cs typeface="+mn-cs"/>
-              </a:rPr>
-              <a:t>Step:</a:t>
-            </a:r>
-            <a:r>
-              <a:rPr lang="en-US" sz="1200" b="0" i="0" kern="1200" dirty="0">
-                <a:solidFill>
-                  <a:schemeClr val="tx1"/>
-                </a:solidFill>
-                <a:effectLst/>
-                <a:latin typeface="+mn-lt"/>
-                <a:ea typeface="+mn-ea"/>
-                <a:cs typeface="+mn-cs"/>
-              </a:rPr>
-              <a:t> Represents an atomic unit of work—this could be a code function, an API call, an LLM invocation, or even a human intervention. Steps are modular and emit events upon completion, enabling fine-grained control and monitoring.</a:t>
-            </a:r>
-          </a:p>
-          <a:p>
-            <a:pPr lvl="1"/>
-            <a:r>
-              <a:rPr lang="en-US" sz="1200" b="1" i="0" kern="1200" dirty="0">
-                <a:solidFill>
-                  <a:schemeClr val="tx1"/>
-                </a:solidFill>
-                <a:effectLst/>
-                <a:latin typeface="+mn-lt"/>
-                <a:ea typeface="+mn-ea"/>
-                <a:cs typeface="+mn-cs"/>
-              </a:rPr>
-              <a:t>Routing:</a:t>
-            </a:r>
-            <a:r>
-              <a:rPr lang="en-US" sz="1200" b="0" i="0" kern="1200" dirty="0">
-                <a:solidFill>
-                  <a:schemeClr val="tx1"/>
-                </a:solidFill>
-                <a:effectLst/>
-                <a:latin typeface="+mn-lt"/>
-                <a:ea typeface="+mn-ea"/>
-                <a:cs typeface="+mn-cs"/>
-              </a:rPr>
-              <a:t> The framework supports dynamic routing, where events generated by steps determine the next step in the workflow. This enables branching, conditional logic, and flexible data flow control.</a:t>
-            </a:r>
-          </a:p>
-          <a:p>
-            <a:pPr lvl="1"/>
-            <a:r>
-              <a:rPr lang="en-US" sz="1200" b="1" i="0" kern="1200" dirty="0">
-                <a:solidFill>
-                  <a:schemeClr val="tx1"/>
-                </a:solidFill>
-                <a:effectLst/>
-                <a:latin typeface="+mn-lt"/>
-                <a:ea typeface="+mn-ea"/>
-                <a:cs typeface="+mn-cs"/>
-              </a:rPr>
-              <a:t>Patterns:</a:t>
-            </a:r>
-            <a:r>
-              <a:rPr lang="en-US" sz="1200" b="0" i="0" kern="1200" dirty="0">
-                <a:solidFill>
-                  <a:schemeClr val="tx1"/>
-                </a:solidFill>
-                <a:effectLst/>
-                <a:latin typeface="+mn-lt"/>
-                <a:ea typeface="+mn-ea"/>
-                <a:cs typeface="+mn-cs"/>
-              </a:rPr>
-              <a:t> Built-in orchestration patterns such as fan-out/fan-in, loops, and map-reduce allow developers to model complex workflows efficiently. These patterns are essential for scaling processes, handling parallelism, and aggregating results.</a:t>
-            </a:r>
-          </a:p>
-          <a:p>
-            <a:endParaRPr lang="en-US" sz="1200" b="1" i="0" kern="1200" dirty="0">
-              <a:solidFill>
-                <a:schemeClr val="tx1"/>
-              </a:solidFill>
-              <a:effectLst/>
-              <a:latin typeface="+mn-lt"/>
-              <a:ea typeface="+mn-ea"/>
-              <a:cs typeface="+mn-cs"/>
-            </a:endParaRPr>
-          </a:p>
-          <a:p>
-            <a:r>
-              <a:rPr lang="en-US" sz="1200" b="1" i="0" kern="1200" dirty="0">
-                <a:solidFill>
-                  <a:schemeClr val="tx1"/>
-                </a:solidFill>
-                <a:effectLst/>
-                <a:latin typeface="+mn-lt"/>
-                <a:ea typeface="+mn-ea"/>
-                <a:cs typeface="+mn-cs"/>
-              </a:rPr>
-              <a:t>Why It Matters:</a:t>
-            </a:r>
-            <a:r>
-              <a:rPr lang="en-US" sz="1200" b="0" i="0" kern="1200" dirty="0">
-                <a:solidFill>
-                  <a:schemeClr val="tx1"/>
-                </a:solidFill>
-                <a:effectLst/>
-                <a:latin typeface="+mn-lt"/>
-                <a:ea typeface="+mn-ea"/>
-                <a:cs typeface="+mn-cs"/>
-              </a:rPr>
-              <a:t> The process framework is ideal for scenarios requiring traceability, compliance, and robust error handling. It enables organizations to build workflows that are both flexible and auditable, supporting use cases like employee onboarding, document review, and automated QA.</a:t>
-            </a:r>
-          </a:p>
-          <a:p>
-            <a:endParaRPr lang="en-US" sz="1200" b="1" i="0" kern="1200" dirty="0">
-              <a:solidFill>
-                <a:schemeClr val="tx1"/>
-              </a:solidFill>
-              <a:effectLst/>
-              <a:latin typeface="+mn-lt"/>
-              <a:ea typeface="+mn-ea"/>
-              <a:cs typeface="+mn-cs"/>
-            </a:endParaRPr>
-          </a:p>
-          <a:p>
-            <a:r>
-              <a:rPr lang="en-US" sz="1200" b="1" i="0" kern="1200" dirty="0">
-                <a:solidFill>
-                  <a:schemeClr val="tx1"/>
-                </a:solidFill>
-                <a:effectLst/>
-                <a:latin typeface="+mn-lt"/>
-                <a:ea typeface="+mn-ea"/>
-                <a:cs typeface="+mn-cs"/>
-              </a:rPr>
-              <a:t>Current Status:</a:t>
-            </a:r>
-            <a:r>
-              <a:rPr lang="en-US" sz="1200" b="0" i="0" kern="1200" dirty="0">
-                <a:solidFill>
-                  <a:schemeClr val="tx1"/>
-                </a:solidFill>
-                <a:effectLst/>
-                <a:latin typeface="+mn-lt"/>
-                <a:ea typeface="+mn-ea"/>
-                <a:cs typeface="+mn-cs"/>
-              </a:rPr>
-              <a:t> The process framework is still experimental and evolving. Developers should be aware that APIs and capabilities may change as the framework matures.</a:t>
-            </a:r>
-          </a:p>
-          <a:p>
-            <a:endParaRPr lang="en-US" sz="1200" b="1" i="0" kern="1200" dirty="0">
-              <a:solidFill>
-                <a:schemeClr val="tx1"/>
-              </a:solidFill>
-              <a:effectLst/>
-              <a:latin typeface="+mn-lt"/>
-              <a:ea typeface="+mn-ea"/>
-              <a:cs typeface="+mn-cs"/>
-            </a:endParaRPr>
-          </a:p>
-          <a:p>
-            <a:r>
-              <a:rPr lang="en-US" sz="1200" b="1" i="0" kern="1200" dirty="0">
-                <a:solidFill>
-                  <a:schemeClr val="tx1"/>
-                </a:solidFill>
-                <a:effectLst/>
-                <a:latin typeface="+mn-lt"/>
-                <a:ea typeface="+mn-ea"/>
-                <a:cs typeface="+mn-cs"/>
-              </a:rPr>
-              <a:t>Summary:</a:t>
-            </a:r>
-            <a:r>
-              <a:rPr lang="en-US" sz="1200" b="0" i="0" kern="1200" dirty="0">
-                <a:solidFill>
-                  <a:schemeClr val="tx1"/>
-                </a:solidFill>
-                <a:effectLst/>
-                <a:latin typeface="+mn-lt"/>
-                <a:ea typeface="+mn-ea"/>
-                <a:cs typeface="+mn-cs"/>
-              </a:rPr>
-              <a:t> By leveraging the process framework, Semantic Kernel empowers teams to build sophisticated, event-driven workflows that integrate AI, automation, and human-in-the-loop processes—all within a unified orchestration model.</a:t>
-            </a:r>
-          </a:p>
-          <a:p>
             <a:endParaRPr lang="en-US" dirty="0"/>
           </a:p>
         </p:txBody>
@@ -5723,7 +5660,7 @@
     </p:spTree>
     <p:extLst>
       <p:ext uri="{BB962C8B-B14F-4D97-AF65-F5344CB8AC3E}">
-        <p14:creationId xmlns:p14="http://schemas.microsoft.com/office/powerpoint/2010/main" val="2037049185"/>
+        <p14:creationId xmlns:p14="http://schemas.microsoft.com/office/powerpoint/2010/main" val="57690925"/>
       </p:ext>
     </p:extLst>
   </p:cSld>
@@ -5787,7 +5724,7 @@
                 <a:ea typeface="+mn-ea"/>
                 <a:cs typeface="+mn-cs"/>
               </a:rPr>
-              <a:t>This slide compares two orchestration paradigms in Semantic Kernel: the Agent Framework and the Process Framework.</a:t>
+              <a:t>The Process Framework in Semantic Kernel introduces a new paradigm for orchestrating complex, event-driven workflows.</a:t>
             </a:r>
             <a:endParaRPr lang="en-US" sz="1200" b="0" i="0" kern="1200" dirty="0">
               <a:solidFill>
@@ -5800,6 +5737,31 @@
             </a:endParaRPr>
           </a:p>
           <a:p>
+            <a:endParaRPr lang="en-US" sz="1200" b="0" i="0" kern="1200" dirty="0">
+              <a:solidFill>
+                <a:schemeClr val="tx1"/>
+              </a:solidFill>
+              <a:effectLst/>
+              <a:latin typeface="+mn-lt"/>
+              <a:ea typeface="+mn-ea"/>
+              <a:cs typeface="+mn-cs"/>
+            </a:endParaRPr>
+          </a:p>
+          <a:p>
+            <a:r>
+              <a:rPr lang="en-US" sz="1200" b="0" i="0" kern="1200" dirty="0">
+                <a:solidFill>
+                  <a:schemeClr val="tx1"/>
+                </a:solidFill>
+                <a:effectLst/>
+                <a:latin typeface="+mn-lt"/>
+                <a:ea typeface="+mn-ea"/>
+                <a:cs typeface="+mn-cs"/>
+              </a:rPr>
+              <a:t>Unlike the agent framework, which is primarily focused on conversational and LLM-driven interactions, the process framework is designed for structured, auditable automation—ideal for business processes, approvals, and multi-step tasks.</a:t>
+            </a:r>
+          </a:p>
+          <a:p>
             <a:endParaRPr lang="en-US" sz="1200" b="1" i="0" kern="1200" dirty="0">
               <a:solidFill>
                 <a:schemeClr val="tx1"/>
@@ -5821,7 +5783,7 @@
                 <a:ea typeface="+mn-ea"/>
                 <a:cs typeface="+mn-cs"/>
               </a:rPr>
-              <a:t>Agent Framework:</a:t>
+              <a:t>Key Concepts:</a:t>
             </a:r>
             <a:endParaRPr lang="en-US" sz="1200" b="0" i="0" kern="1200" dirty="0">
               <a:solidFill>
@@ -5834,10 +5796,19 @@
             </a:endParaRPr>
           </a:p>
           <a:p>
-            <a:pPr marL="628650" lvl="1" indent="-171450">
-              <a:buFont typeface="Arial" panose="020B0604020202020204" pitchFamily="34" charset="0"/>
-              <a:buChar char="•"/>
-            </a:pPr>
+            <a:pPr lvl="1"/>
+            <a:r>
+              <a:rPr lang="en-US" sz="1200" b="1" i="0" kern="1200" dirty="0">
+                <a:solidFill>
+                  <a:schemeClr val="tx1"/>
+                </a:solidFill>
+                <a:effectLst/>
+                <a:latin typeface="+mn-lt"/>
+                <a:ea typeface="+mn-ea"/>
+                <a:cs typeface="+mn-cs"/>
+              </a:rPr>
+              <a:t>Process:</a:t>
+            </a:r>
             <a:r>
               <a:rPr lang="en-US" sz="1200" b="0" i="0" kern="1200" dirty="0">
                 <a:solidFill>
@@ -5848,14 +5819,23 @@
                 <a:ea typeface="+mn-ea"/>
                 <a:cs typeface="+mn-cs"/>
               </a:rPr>
-              <a:t>Designed for LLM-driven conversations and interactive AI experiences.</a:t>
-            </a:r>
-          </a:p>
-          <a:p>
-            <a:pPr marL="628650" lvl="1" indent="-171450">
-              <a:buFont typeface="Arial" panose="020B0604020202020204" pitchFamily="34" charset="0"/>
-              <a:buChar char="•"/>
-            </a:pPr>
+              <a:t> Acts as the orchestrator, managing a sequence of modular steps. Each process is reusable and can be triggered by events, making it highly adaptable to changing business requirements.</a:t>
+            </a:r>
+          </a:p>
+          <a:p>
+            <a:pPr lvl="1"/>
+            <a:r>
+              <a:rPr lang="en-US" sz="1200" b="1" i="0" kern="1200" dirty="0">
+                <a:solidFill>
+                  <a:schemeClr val="tx1"/>
+                </a:solidFill>
+                <a:effectLst/>
+                <a:latin typeface="+mn-lt"/>
+                <a:ea typeface="+mn-ea"/>
+                <a:cs typeface="+mn-cs"/>
+              </a:rPr>
+              <a:t>Step:</a:t>
+            </a:r>
             <a:r>
               <a:rPr lang="en-US" sz="1200" b="0" i="0" kern="1200" dirty="0">
                 <a:solidFill>
@@ -5866,14 +5846,23 @@
                 <a:ea typeface="+mn-ea"/>
                 <a:cs typeface="+mn-cs"/>
               </a:rPr>
-              <a:t>Agents encapsulate orchestration logic, leveraging plugins and tools to automate tasks within conversational threads.</a:t>
-            </a:r>
-          </a:p>
-          <a:p>
-            <a:pPr marL="628650" lvl="1" indent="-171450">
-              <a:buFont typeface="Arial" panose="020B0604020202020204" pitchFamily="34" charset="0"/>
-              <a:buChar char="•"/>
-            </a:pPr>
+              <a:t> Represents an atomic unit of work—this could be a code function, an API call, an LLM invocation, or even a human intervention. Steps are modular and emit events upon completion, enabling fine-grained control and monitoring.</a:t>
+            </a:r>
+          </a:p>
+          <a:p>
+            <a:pPr lvl="1"/>
+            <a:r>
+              <a:rPr lang="en-US" sz="1200" b="1" i="0" kern="1200" dirty="0">
+                <a:solidFill>
+                  <a:schemeClr val="tx1"/>
+                </a:solidFill>
+                <a:effectLst/>
+                <a:latin typeface="+mn-lt"/>
+                <a:ea typeface="+mn-ea"/>
+                <a:cs typeface="+mn-cs"/>
+              </a:rPr>
+              <a:t>Routing:</a:t>
+            </a:r>
             <a:r>
               <a:rPr lang="en-US" sz="1200" b="0" i="0" kern="1200" dirty="0">
                 <a:solidFill>
@@ -5884,14 +5873,23 @@
                 <a:ea typeface="+mn-ea"/>
                 <a:cs typeface="+mn-cs"/>
               </a:rPr>
-              <a:t>Ideal for chatbots, copilots, and tool agents that require context management, multi-turn dialogue, and dynamic function calling.</a:t>
-            </a:r>
-          </a:p>
-          <a:p>
-            <a:pPr marL="628650" lvl="1" indent="-171450">
-              <a:buFont typeface="Arial" panose="020B0604020202020204" pitchFamily="34" charset="0"/>
-              <a:buChar char="•"/>
-            </a:pPr>
+              <a:t> The framework supports dynamic routing, where events generated by steps determine the next step in the workflow. This enables branching, conditional logic, and flexible data flow control.</a:t>
+            </a:r>
+          </a:p>
+          <a:p>
+            <a:pPr lvl="1"/>
+            <a:r>
+              <a:rPr lang="en-US" sz="1200" b="1" i="0" kern="1200" dirty="0">
+                <a:solidFill>
+                  <a:schemeClr val="tx1"/>
+                </a:solidFill>
+                <a:effectLst/>
+                <a:latin typeface="+mn-lt"/>
+                <a:ea typeface="+mn-ea"/>
+                <a:cs typeface="+mn-cs"/>
+              </a:rPr>
+              <a:t>Patterns:</a:t>
+            </a:r>
             <a:r>
               <a:rPr lang="en-US" sz="1200" b="0" i="0" kern="1200" dirty="0">
                 <a:solidFill>
@@ -5902,43 +5900,7 @@
                 <a:ea typeface="+mn-ea"/>
                 <a:cs typeface="+mn-cs"/>
               </a:rPr>
-              <a:t>Threaded execution is supported, especially via Azure AI Agent, enabling scalable, production-ready deployments.</a:t>
-            </a:r>
-          </a:p>
-          <a:p>
-            <a:pPr marL="628650" lvl="1" indent="-171450">
-              <a:buFont typeface="Arial" panose="020B0604020202020204" pitchFamily="34" charset="0"/>
-              <a:buChar char="•"/>
-            </a:pPr>
-            <a:r>
-              <a:rPr lang="en-US" sz="1200" b="0" i="0" kern="1200" dirty="0">
-                <a:solidFill>
-                  <a:schemeClr val="tx1"/>
-                </a:solidFill>
-                <a:effectLst/>
-                <a:latin typeface="+mn-lt"/>
-                <a:ea typeface="+mn-ea"/>
-                <a:cs typeface="+mn-cs"/>
-              </a:rPr>
-              <a:t>Common use cases include helpdesk bots, data agents, and AI copilots—where conversational intelligence and tool integration are paramount.</a:t>
-            </a:r>
-          </a:p>
-          <a:p>
-            <a:pPr marL="628650" lvl="1" indent="-171450">
-              <a:buFont typeface="Arial" panose="020B0604020202020204" pitchFamily="34" charset="0"/>
-              <a:buChar char="•"/>
-            </a:pPr>
-            <a:r>
-              <a:rPr lang="en-US" sz="1200" b="0" i="0" kern="1200" dirty="0">
-                <a:solidFill>
-                  <a:schemeClr val="tx1"/>
-                </a:solidFill>
-                <a:effectLst/>
-                <a:latin typeface="+mn-lt"/>
-                <a:ea typeface="+mn-ea"/>
-                <a:cs typeface="+mn-cs"/>
-              </a:rPr>
-              <a:t>The agent framework is mature and suitable for production environments.</a:t>
+              <a:t> Built-in orchestration patterns such as fan-out/fan-in, loops, and map-reduce allow developers to model complex workflows efficiently. These patterns are essential for scaling processes, handling parallelism, and aggregating results.</a:t>
             </a:r>
           </a:p>
           <a:p>
@@ -5963,23 +5925,8 @@
                 <a:ea typeface="+mn-ea"/>
                 <a:cs typeface="+mn-cs"/>
               </a:rPr>
-              <a:t>Process Framework (Experimental):</a:t>
-            </a:r>
-            <a:endParaRPr lang="en-US" sz="1200" b="0" i="0" kern="1200" dirty="0">
-              <a:solidFill>
-                <a:schemeClr val="tx1"/>
-              </a:solidFill>
-              <a:effectLst/>
-              <a:latin typeface="+mn-lt"/>
-              <a:ea typeface="+mn-ea"/>
-              <a:cs typeface="+mn-cs"/>
-            </a:endParaRPr>
-          </a:p>
-          <a:p>
-            <a:pPr marL="628650" lvl="1" indent="-171450">
-              <a:buFont typeface="Arial" panose="020B0604020202020204" pitchFamily="34" charset="0"/>
-              <a:buChar char="•"/>
-            </a:pPr>
+              <a:t>Why It Matters:</a:t>
+            </a:r>
             <a:r>
               <a:rPr lang="en-US" sz="1200" b="0" i="0" kern="1200" dirty="0">
                 <a:solidFill>
@@ -5990,79 +5937,7 @@
                 <a:ea typeface="+mn-ea"/>
                 <a:cs typeface="+mn-cs"/>
               </a:rPr>
-              <a:t>Focused on event-driven, structured workflows rather than conversational threads.</a:t>
-            </a:r>
-          </a:p>
-          <a:p>
-            <a:pPr marL="628650" lvl="1" indent="-171450">
-              <a:buFont typeface="Arial" panose="020B0604020202020204" pitchFamily="34" charset="0"/>
-              <a:buChar char="•"/>
-            </a:pPr>
-            <a:r>
-              <a:rPr lang="en-US" sz="1200" b="0" i="0" kern="1200" dirty="0">
-                <a:solidFill>
-                  <a:schemeClr val="tx1"/>
-                </a:solidFill>
-                <a:effectLst/>
-                <a:latin typeface="+mn-lt"/>
-                <a:ea typeface="+mn-ea"/>
-                <a:cs typeface="+mn-cs"/>
-              </a:rPr>
-              <a:t>Processes are composed of modular steps, each representing a function, API call, LLM invocation, or human intervention.</a:t>
-            </a:r>
-          </a:p>
-          <a:p>
-            <a:pPr marL="628650" lvl="1" indent="-171450">
-              <a:buFont typeface="Arial" panose="020B0604020202020204" pitchFamily="34" charset="0"/>
-              <a:buChar char="•"/>
-            </a:pPr>
-            <a:r>
-              <a:rPr lang="en-US" sz="1200" b="0" i="0" kern="1200" dirty="0">
-                <a:solidFill>
-                  <a:schemeClr val="tx1"/>
-                </a:solidFill>
-                <a:effectLst/>
-                <a:latin typeface="+mn-lt"/>
-                <a:ea typeface="+mn-ea"/>
-                <a:cs typeface="+mn-cs"/>
-              </a:rPr>
-              <a:t>Supports advanced workflow patterns such as approvals, pipelines, and multi-step tasks, with step-level state management, logging, and telemetry.</a:t>
-            </a:r>
-          </a:p>
-          <a:p>
-            <a:pPr marL="628650" lvl="1" indent="-171450">
-              <a:buFont typeface="Arial" panose="020B0604020202020204" pitchFamily="34" charset="0"/>
-              <a:buChar char="•"/>
-            </a:pPr>
-            <a:r>
-              <a:rPr lang="en-US" sz="1200" b="0" i="0" kern="1200" dirty="0">
-                <a:solidFill>
-                  <a:schemeClr val="tx1"/>
-                </a:solidFill>
-                <a:effectLst/>
-                <a:latin typeface="+mn-lt"/>
-                <a:ea typeface="+mn-ea"/>
-                <a:cs typeface="+mn-cs"/>
-              </a:rPr>
-              <a:t>Enables robust automation for business processes like employee onboarding, document review, and automated QA.</a:t>
-            </a:r>
-          </a:p>
-          <a:p>
-            <a:pPr marL="628650" lvl="1" indent="-171450">
-              <a:buFont typeface="Arial" panose="020B0604020202020204" pitchFamily="34" charset="0"/>
-              <a:buChar char="•"/>
-            </a:pPr>
-            <a:r>
-              <a:rPr lang="en-US" sz="1200" b="0" i="0" kern="1200" dirty="0">
-                <a:solidFill>
-                  <a:schemeClr val="tx1"/>
-                </a:solidFill>
-                <a:effectLst/>
-                <a:latin typeface="+mn-lt"/>
-                <a:ea typeface="+mn-ea"/>
-                <a:cs typeface="+mn-cs"/>
-              </a:rPr>
-              <a:t>The process framework is still experimental and evolving, so APIs and capabilities may change as it matures.</a:t>
+              <a:t> The process framework is ideal for scenarios requiring traceability, compliance, and robust error handling. It enables organizations to build workflows that are both flexible and auditable, supporting use cases like employee onboarding, document review, and automated QA.</a:t>
             </a:r>
           </a:p>
           <a:p>
@@ -6087,9 +5962,23 @@
                 <a:ea typeface="+mn-ea"/>
                 <a:cs typeface="+mn-cs"/>
               </a:rPr>
-              <a:t>Summary:</a:t>
-            </a:r>
-            <a:endParaRPr lang="en-US" sz="1200" b="0" i="0" kern="1200" dirty="0">
+              <a:t>Current Status:</a:t>
+            </a:r>
+            <a:r>
+              <a:rPr lang="en-US" sz="1200" b="0" i="0" kern="1200" dirty="0">
+                <a:solidFill>
+                  <a:schemeClr val="tx1"/>
+                </a:solidFill>
+                <a:effectLst/>
+                <a:latin typeface="+mn-lt"/>
+                <a:ea typeface="+mn-ea"/>
+                <a:cs typeface="+mn-cs"/>
+              </a:rPr>
+              <a:t> The process framework is still experimental and evolving. Developers should be aware that APIs and capabilities may change as the framework matures.</a:t>
+            </a:r>
+          </a:p>
+          <a:p>
+            <a:endParaRPr lang="en-US" sz="1200" b="1" i="0" kern="1200" dirty="0">
               <a:solidFill>
                 <a:schemeClr val="tx1"/>
               </a:solidFill>
@@ -6100,10 +5989,18 @@
             </a:endParaRPr>
           </a:p>
           <a:p>
-            <a:pPr marL="628650" lvl="1" indent="-171450">
-              <a:buFont typeface="Arial" panose="020B0604020202020204" pitchFamily="34" charset="0"/>
-              <a:buChar char="•"/>
-            </a:pPr>
+            <a:r>
+              <a:rPr lang="en-US" sz="1200" b="1" i="0" kern="1200" dirty="0">
+                <a:solidFill>
+                  <a:schemeClr val="tx1"/>
+                </a:solidFill>
+                <a:effectLst/>
+                <a:latin typeface="+mn-lt"/>
+                <a:ea typeface="+mn-ea"/>
+                <a:cs typeface="+mn-cs"/>
+              </a:rPr>
+              <a:t>Summary:</a:t>
+            </a:r>
             <a:r>
               <a:rPr lang="en-US" sz="1200" b="0" i="0" kern="1200" dirty="0">
                 <a:solidFill>
@@ -6114,43 +6011,7 @@
                 <a:ea typeface="+mn-ea"/>
                 <a:cs typeface="+mn-cs"/>
               </a:rPr>
-              <a:t>Use the Agent Framework for conversational AI scenarios requiring rich dialogue, context, and tool orchestration.</a:t>
-            </a:r>
-          </a:p>
-          <a:p>
-            <a:pPr marL="628650" lvl="1" indent="-171450">
-              <a:buFont typeface="Arial" panose="020B0604020202020204" pitchFamily="34" charset="0"/>
-              <a:buChar char="•"/>
-            </a:pPr>
-            <a:r>
-              <a:rPr lang="en-US" sz="1200" b="0" i="0" kern="1200" dirty="0">
-                <a:solidFill>
-                  <a:schemeClr val="tx1"/>
-                </a:solidFill>
-                <a:effectLst/>
-                <a:latin typeface="+mn-lt"/>
-                <a:ea typeface="+mn-ea"/>
-                <a:cs typeface="+mn-cs"/>
-              </a:rPr>
-              <a:t>Use the Process Framework for structured, auditable workflows that demand traceability, compliance, and robust automation.</a:t>
-            </a:r>
-          </a:p>
-          <a:p>
-            <a:pPr marL="628650" lvl="1" indent="-171450">
-              <a:buFont typeface="Arial" panose="020B0604020202020204" pitchFamily="34" charset="0"/>
-              <a:buChar char="•"/>
-            </a:pPr>
-            <a:r>
-              <a:rPr lang="en-US" sz="1200" b="0" i="0" kern="1200" dirty="0">
-                <a:solidFill>
-                  <a:schemeClr val="tx1"/>
-                </a:solidFill>
-                <a:effectLst/>
-                <a:latin typeface="+mn-lt"/>
-                <a:ea typeface="+mn-ea"/>
-                <a:cs typeface="+mn-cs"/>
-              </a:rPr>
-              <a:t>Understanding the strengths and limitations of each framework helps teams choose the right approach for their application’s requirements and enterprise needs.</a:t>
+              <a:t> By leveraging the process framework, Semantic Kernel empowers teams to build sophisticated, event-driven workflows that integrate AI, automation, and human-in-the-loop processes—all within a unified orchestration model.</a:t>
             </a:r>
           </a:p>
           <a:p>
@@ -6176,6 +6037,467 @@
             <a:fld id="{9DB6582F-CBB7-4C9A-87B6-76D328371F43}" type="slidenum">
               <a:rPr lang="en-US" smtClean="0"/>
               <a:t>27</a:t>
+            </a:fld>
+            <a:endParaRPr lang="en-US"/>
+          </a:p>
+        </p:txBody>
+      </p:sp>
+    </p:spTree>
+    <p:extLst>
+      <p:ext uri="{BB962C8B-B14F-4D97-AF65-F5344CB8AC3E}">
+        <p14:creationId xmlns:p14="http://schemas.microsoft.com/office/powerpoint/2010/main" val="2037049185"/>
+      </p:ext>
+    </p:extLst>
+  </p:cSld>
+  <p:clrMapOvr>
+    <a:masterClrMapping/>
+  </p:clrMapOvr>
+</p:notes>
+</file>
+
+<file path=ppt/notesSlides/notesSlide26.xml><?xml version="1.0" encoding="utf-8"?>
+<p:notes xmlns:a="http://schemas.openxmlformats.org/drawingml/2006/main" xmlns:r="http://schemas.openxmlformats.org/officeDocument/2006/relationships" xmlns:p="http://schemas.openxmlformats.org/presentationml/2006/main">
+  <p:cSld>
+    <p:spTree>
+      <p:nvGrpSpPr>
+        <p:cNvPr id="1" name=""/>
+        <p:cNvGrpSpPr/>
+        <p:nvPr/>
+      </p:nvGrpSpPr>
+      <p:grpSpPr>
+        <a:xfrm>
+          <a:off x="0" y="0"/>
+          <a:ext cx="0" cy="0"/>
+          <a:chOff x="0" y="0"/>
+          <a:chExt cx="0" cy="0"/>
+        </a:xfrm>
+      </p:grpSpPr>
+      <p:sp>
+        <p:nvSpPr>
+          <p:cNvPr id="2" name="Slide Image Placeholder 1"/>
+          <p:cNvSpPr>
+            <a:spLocks noGrp="1" noRot="1" noChangeAspect="1"/>
+          </p:cNvSpPr>
+          <p:nvPr>
+            <p:ph type="sldImg"/>
+          </p:nvPr>
+        </p:nvSpPr>
+        <p:spPr/>
+      </p:sp>
+      <p:sp>
+        <p:nvSpPr>
+          <p:cNvPr id="3" name="Notes Placeholder 2"/>
+          <p:cNvSpPr>
+            <a:spLocks noGrp="1"/>
+          </p:cNvSpPr>
+          <p:nvPr>
+            <p:ph type="body" idx="1"/>
+          </p:nvPr>
+        </p:nvSpPr>
+        <p:spPr/>
+        <p:txBody>
+          <a:bodyPr/>
+          <a:lstStyle/>
+          <a:p>
+            <a:r>
+              <a:rPr lang="en-US" sz="1200" b="1" i="0" kern="1200" dirty="0">
+                <a:solidFill>
+                  <a:schemeClr val="tx1"/>
+                </a:solidFill>
+                <a:effectLst/>
+                <a:latin typeface="+mn-lt"/>
+                <a:ea typeface="+mn-ea"/>
+                <a:cs typeface="+mn-cs"/>
+              </a:rPr>
+              <a:t>This slide compares two orchestration paradigms in Semantic Kernel: the Agent Framework and the Process Framework.</a:t>
+            </a:r>
+            <a:endParaRPr lang="en-US" sz="1200" b="0" i="0" kern="1200" dirty="0">
+              <a:solidFill>
+                <a:schemeClr val="tx1"/>
+              </a:solidFill>
+              <a:effectLst/>
+              <a:latin typeface="+mn-lt"/>
+              <a:ea typeface="+mn-ea"/>
+              <a:cs typeface="+mn-cs"/>
+            </a:endParaRPr>
+          </a:p>
+          <a:p>
+            <a:endParaRPr lang="en-US" sz="1200" b="1" i="0" kern="1200" dirty="0">
+              <a:solidFill>
+                <a:schemeClr val="tx1"/>
+              </a:solidFill>
+              <a:effectLst/>
+              <a:latin typeface="+mn-lt"/>
+              <a:ea typeface="+mn-ea"/>
+              <a:cs typeface="+mn-cs"/>
+            </a:endParaRPr>
+          </a:p>
+          <a:p>
+            <a:r>
+              <a:rPr lang="en-US" sz="1200" b="1" i="0" kern="1200" dirty="0">
+                <a:solidFill>
+                  <a:schemeClr val="tx1"/>
+                </a:solidFill>
+                <a:effectLst/>
+                <a:latin typeface="+mn-lt"/>
+                <a:ea typeface="+mn-ea"/>
+                <a:cs typeface="+mn-cs"/>
+              </a:rPr>
+              <a:t>Agent Framework:</a:t>
+            </a:r>
+            <a:endParaRPr lang="en-US" sz="1200" b="0" i="0" kern="1200" dirty="0">
+              <a:solidFill>
+                <a:schemeClr val="tx1"/>
+              </a:solidFill>
+              <a:effectLst/>
+              <a:latin typeface="+mn-lt"/>
+              <a:ea typeface="+mn-ea"/>
+              <a:cs typeface="+mn-cs"/>
+            </a:endParaRPr>
+          </a:p>
+          <a:p>
+            <a:pPr marL="628650" lvl="1" indent="-171450">
+              <a:buFont typeface="Arial" panose="020B0604020202020204" pitchFamily="34" charset="0"/>
+              <a:buChar char="•"/>
+            </a:pPr>
+            <a:r>
+              <a:rPr lang="en-US" sz="1200" b="0" i="0" kern="1200" dirty="0">
+                <a:solidFill>
+                  <a:schemeClr val="tx1"/>
+                </a:solidFill>
+                <a:effectLst/>
+                <a:latin typeface="+mn-lt"/>
+                <a:ea typeface="+mn-ea"/>
+                <a:cs typeface="+mn-cs"/>
+              </a:rPr>
+              <a:t>Designed for LLM-driven conversations and interactive AI experiences.</a:t>
+            </a:r>
+          </a:p>
+          <a:p>
+            <a:pPr marL="628650" lvl="1" indent="-171450">
+              <a:buFont typeface="Arial" panose="020B0604020202020204" pitchFamily="34" charset="0"/>
+              <a:buChar char="•"/>
+            </a:pPr>
+            <a:r>
+              <a:rPr lang="en-US" sz="1200" b="0" i="0" kern="1200" dirty="0">
+                <a:solidFill>
+                  <a:schemeClr val="tx1"/>
+                </a:solidFill>
+                <a:effectLst/>
+                <a:latin typeface="+mn-lt"/>
+                <a:ea typeface="+mn-ea"/>
+                <a:cs typeface="+mn-cs"/>
+              </a:rPr>
+              <a:t>Agents encapsulate orchestration logic, leveraging plugins and tools to automate tasks within conversational threads.</a:t>
+            </a:r>
+          </a:p>
+          <a:p>
+            <a:pPr marL="628650" lvl="1" indent="-171450">
+              <a:buFont typeface="Arial" panose="020B0604020202020204" pitchFamily="34" charset="0"/>
+              <a:buChar char="•"/>
+            </a:pPr>
+            <a:r>
+              <a:rPr lang="en-US" sz="1200" b="0" i="0" kern="1200" dirty="0">
+                <a:solidFill>
+                  <a:schemeClr val="tx1"/>
+                </a:solidFill>
+                <a:effectLst/>
+                <a:latin typeface="+mn-lt"/>
+                <a:ea typeface="+mn-ea"/>
+                <a:cs typeface="+mn-cs"/>
+              </a:rPr>
+              <a:t>Ideal for chatbots, copilots, and tool agents that require context management, multi-turn dialogue, and dynamic function calling.</a:t>
+            </a:r>
+          </a:p>
+          <a:p>
+            <a:pPr marL="628650" lvl="1" indent="-171450">
+              <a:buFont typeface="Arial" panose="020B0604020202020204" pitchFamily="34" charset="0"/>
+              <a:buChar char="•"/>
+            </a:pPr>
+            <a:r>
+              <a:rPr lang="en-US" sz="1200" b="0" i="0" kern="1200" dirty="0">
+                <a:solidFill>
+                  <a:schemeClr val="tx1"/>
+                </a:solidFill>
+                <a:effectLst/>
+                <a:latin typeface="+mn-lt"/>
+                <a:ea typeface="+mn-ea"/>
+                <a:cs typeface="+mn-cs"/>
+              </a:rPr>
+              <a:t>Threaded execution is supported, especially via Azure AI Agent, enabling scalable, production-ready deployments.</a:t>
+            </a:r>
+          </a:p>
+          <a:p>
+            <a:pPr marL="628650" lvl="1" indent="-171450">
+              <a:buFont typeface="Arial" panose="020B0604020202020204" pitchFamily="34" charset="0"/>
+              <a:buChar char="•"/>
+            </a:pPr>
+            <a:r>
+              <a:rPr lang="en-US" sz="1200" b="0" i="0" kern="1200" dirty="0">
+                <a:solidFill>
+                  <a:schemeClr val="tx1"/>
+                </a:solidFill>
+                <a:effectLst/>
+                <a:latin typeface="+mn-lt"/>
+                <a:ea typeface="+mn-ea"/>
+                <a:cs typeface="+mn-cs"/>
+              </a:rPr>
+              <a:t>Common use cases include helpdesk bots, data agents, and AI copilots—where conversational intelligence and tool integration are paramount.</a:t>
+            </a:r>
+          </a:p>
+          <a:p>
+            <a:pPr marL="628650" lvl="1" indent="-171450">
+              <a:buFont typeface="Arial" panose="020B0604020202020204" pitchFamily="34" charset="0"/>
+              <a:buChar char="•"/>
+            </a:pPr>
+            <a:r>
+              <a:rPr lang="en-US" sz="1200" b="0" i="0" kern="1200" dirty="0">
+                <a:solidFill>
+                  <a:schemeClr val="tx1"/>
+                </a:solidFill>
+                <a:effectLst/>
+                <a:latin typeface="+mn-lt"/>
+                <a:ea typeface="+mn-ea"/>
+                <a:cs typeface="+mn-cs"/>
+              </a:rPr>
+              <a:t>The agent framework is mature and suitable for production environments.</a:t>
+            </a:r>
+          </a:p>
+          <a:p>
+            <a:endParaRPr lang="en-US" sz="1200" b="1" i="0" kern="1200" dirty="0">
+              <a:solidFill>
+                <a:schemeClr val="tx1"/>
+              </a:solidFill>
+              <a:effectLst/>
+              <a:latin typeface="+mn-lt"/>
+              <a:ea typeface="+mn-ea"/>
+              <a:cs typeface="+mn-cs"/>
+            </a:endParaRPr>
+          </a:p>
+          <a:p>
+            <a:r>
+              <a:rPr lang="en-US" sz="1200" b="1" i="0" kern="1200" dirty="0">
+                <a:solidFill>
+                  <a:schemeClr val="tx1"/>
+                </a:solidFill>
+                <a:effectLst/>
+                <a:latin typeface="+mn-lt"/>
+                <a:ea typeface="+mn-ea"/>
+                <a:cs typeface="+mn-cs"/>
+              </a:rPr>
+              <a:t>Process Framework (Experimental):</a:t>
+            </a:r>
+            <a:endParaRPr lang="en-US" sz="1200" b="0" i="0" kern="1200" dirty="0">
+              <a:solidFill>
+                <a:schemeClr val="tx1"/>
+              </a:solidFill>
+              <a:effectLst/>
+              <a:latin typeface="+mn-lt"/>
+              <a:ea typeface="+mn-ea"/>
+              <a:cs typeface="+mn-cs"/>
+            </a:endParaRPr>
+          </a:p>
+          <a:p>
+            <a:pPr marL="628650" lvl="1" indent="-171450">
+              <a:buFont typeface="Arial" panose="020B0604020202020204" pitchFamily="34" charset="0"/>
+              <a:buChar char="•"/>
+            </a:pPr>
+            <a:r>
+              <a:rPr lang="en-US" sz="1200" b="0" i="0" kern="1200" dirty="0">
+                <a:solidFill>
+                  <a:schemeClr val="tx1"/>
+                </a:solidFill>
+                <a:effectLst/>
+                <a:latin typeface="+mn-lt"/>
+                <a:ea typeface="+mn-ea"/>
+                <a:cs typeface="+mn-cs"/>
+              </a:rPr>
+              <a:t>Focused on event-driven, structured workflows rather than conversational threads.</a:t>
+            </a:r>
+          </a:p>
+          <a:p>
+            <a:pPr marL="628650" lvl="1" indent="-171450">
+              <a:buFont typeface="Arial" panose="020B0604020202020204" pitchFamily="34" charset="0"/>
+              <a:buChar char="•"/>
+            </a:pPr>
+            <a:r>
+              <a:rPr lang="en-US" sz="1200" b="0" i="0" kern="1200" dirty="0">
+                <a:solidFill>
+                  <a:schemeClr val="tx1"/>
+                </a:solidFill>
+                <a:effectLst/>
+                <a:latin typeface="+mn-lt"/>
+                <a:ea typeface="+mn-ea"/>
+                <a:cs typeface="+mn-cs"/>
+              </a:rPr>
+              <a:t>Processes are composed of modular steps, each representing a function, API call, LLM invocation, or human intervention.</a:t>
+            </a:r>
+          </a:p>
+          <a:p>
+            <a:pPr marL="628650" lvl="1" indent="-171450">
+              <a:buFont typeface="Arial" panose="020B0604020202020204" pitchFamily="34" charset="0"/>
+              <a:buChar char="•"/>
+            </a:pPr>
+            <a:r>
+              <a:rPr lang="en-US" sz="1200" b="0" i="0" kern="1200" dirty="0">
+                <a:solidFill>
+                  <a:schemeClr val="tx1"/>
+                </a:solidFill>
+                <a:effectLst/>
+                <a:latin typeface="+mn-lt"/>
+                <a:ea typeface="+mn-ea"/>
+                <a:cs typeface="+mn-cs"/>
+              </a:rPr>
+              <a:t>Supports advanced workflow patterns such as approvals, pipelines, and multi-step tasks, with step-level state management, logging, and telemetry.</a:t>
+            </a:r>
+          </a:p>
+          <a:p>
+            <a:pPr marL="628650" lvl="1" indent="-171450">
+              <a:buFont typeface="Arial" panose="020B0604020202020204" pitchFamily="34" charset="0"/>
+              <a:buChar char="•"/>
+            </a:pPr>
+            <a:r>
+              <a:rPr lang="en-US" sz="1200" b="0" i="0" kern="1200" dirty="0">
+                <a:solidFill>
+                  <a:schemeClr val="tx1"/>
+                </a:solidFill>
+                <a:effectLst/>
+                <a:latin typeface="+mn-lt"/>
+                <a:ea typeface="+mn-ea"/>
+                <a:cs typeface="+mn-cs"/>
+              </a:rPr>
+              <a:t>Enables robust automation for business processes like employee onboarding, document review, and automated QA.</a:t>
+            </a:r>
+          </a:p>
+          <a:p>
+            <a:pPr marL="628650" lvl="1" indent="-171450">
+              <a:buFont typeface="Arial" panose="020B0604020202020204" pitchFamily="34" charset="0"/>
+              <a:buChar char="•"/>
+            </a:pPr>
+            <a:r>
+              <a:rPr lang="en-US" sz="1200" b="0" i="0" kern="1200" dirty="0">
+                <a:solidFill>
+                  <a:schemeClr val="tx1"/>
+                </a:solidFill>
+                <a:effectLst/>
+                <a:latin typeface="+mn-lt"/>
+                <a:ea typeface="+mn-ea"/>
+                <a:cs typeface="+mn-cs"/>
+              </a:rPr>
+              <a:t>The process framework is still experimental and evolving, so APIs and capabilities may change as it matures.</a:t>
+            </a:r>
+          </a:p>
+          <a:p>
+            <a:endParaRPr lang="en-US" sz="1200" b="1" i="0" kern="1200" dirty="0">
+              <a:solidFill>
+                <a:schemeClr val="tx1"/>
+              </a:solidFill>
+              <a:effectLst/>
+              <a:latin typeface="+mn-lt"/>
+              <a:ea typeface="+mn-ea"/>
+              <a:cs typeface="+mn-cs"/>
+            </a:endParaRPr>
+          </a:p>
+          <a:p>
+            <a:r>
+              <a:rPr lang="en-US" sz="1200" b="1" i="0" kern="1200" dirty="0">
+                <a:solidFill>
+                  <a:schemeClr val="tx1"/>
+                </a:solidFill>
+                <a:effectLst/>
+                <a:latin typeface="+mn-lt"/>
+                <a:ea typeface="+mn-ea"/>
+                <a:cs typeface="+mn-cs"/>
+              </a:rPr>
+              <a:t>Summary:</a:t>
+            </a:r>
+            <a:endParaRPr lang="en-US" sz="1200" b="0" i="0" kern="1200" dirty="0">
+              <a:solidFill>
+                <a:schemeClr val="tx1"/>
+              </a:solidFill>
+              <a:effectLst/>
+              <a:latin typeface="+mn-lt"/>
+              <a:ea typeface="+mn-ea"/>
+              <a:cs typeface="+mn-cs"/>
+            </a:endParaRPr>
+          </a:p>
+          <a:p>
+            <a:pPr marL="628650" lvl="1" indent="-171450">
+              <a:buFont typeface="Arial" panose="020B0604020202020204" pitchFamily="34" charset="0"/>
+              <a:buChar char="•"/>
+            </a:pPr>
+            <a:r>
+              <a:rPr lang="en-US" sz="1200" b="0" i="0" kern="1200" dirty="0">
+                <a:solidFill>
+                  <a:schemeClr val="tx1"/>
+                </a:solidFill>
+                <a:effectLst/>
+                <a:latin typeface="+mn-lt"/>
+                <a:ea typeface="+mn-ea"/>
+                <a:cs typeface="+mn-cs"/>
+              </a:rPr>
+              <a:t>Use the Agent Framework for conversational AI scenarios requiring rich dialogue, context, and tool orchestration.</a:t>
+            </a:r>
+          </a:p>
+          <a:p>
+            <a:pPr marL="628650" lvl="1" indent="-171450">
+              <a:buFont typeface="Arial" panose="020B0604020202020204" pitchFamily="34" charset="0"/>
+              <a:buChar char="•"/>
+            </a:pPr>
+            <a:r>
+              <a:rPr lang="en-US" sz="1200" b="0" i="0" kern="1200" dirty="0">
+                <a:solidFill>
+                  <a:schemeClr val="tx1"/>
+                </a:solidFill>
+                <a:effectLst/>
+                <a:latin typeface="+mn-lt"/>
+                <a:ea typeface="+mn-ea"/>
+                <a:cs typeface="+mn-cs"/>
+              </a:rPr>
+              <a:t>Use the Process Framework for structured, auditable workflows that demand traceability, compliance, and robust automation.</a:t>
+            </a:r>
+          </a:p>
+          <a:p>
+            <a:pPr marL="628650" lvl="1" indent="-171450">
+              <a:buFont typeface="Arial" panose="020B0604020202020204" pitchFamily="34" charset="0"/>
+              <a:buChar char="•"/>
+            </a:pPr>
+            <a:r>
+              <a:rPr lang="en-US" sz="1200" b="0" i="0" kern="1200" dirty="0">
+                <a:solidFill>
+                  <a:schemeClr val="tx1"/>
+                </a:solidFill>
+                <a:effectLst/>
+                <a:latin typeface="+mn-lt"/>
+                <a:ea typeface="+mn-ea"/>
+                <a:cs typeface="+mn-cs"/>
+              </a:rPr>
+              <a:t>Understanding the strengths and limitations of each framework helps teams choose the right approach for their application’s requirements and enterprise needs.</a:t>
+            </a:r>
+          </a:p>
+          <a:p>
+            <a:endParaRPr lang="en-US" dirty="0"/>
+          </a:p>
+        </p:txBody>
+      </p:sp>
+      <p:sp>
+        <p:nvSpPr>
+          <p:cNvPr id="4" name="Slide Number Placeholder 3"/>
+          <p:cNvSpPr>
+            <a:spLocks noGrp="1"/>
+          </p:cNvSpPr>
+          <p:nvPr>
+            <p:ph type="sldNum" sz="quarter" idx="5"/>
+          </p:nvPr>
+        </p:nvSpPr>
+        <p:spPr/>
+        <p:txBody>
+          <a:bodyPr/>
+          <a:lstStyle/>
+          <a:p>
+            <a:fld id="{9DB6582F-CBB7-4C9A-87B6-76D328371F43}" type="slidenum">
+              <a:rPr lang="en-US" smtClean="0"/>
+              <a:t>28</a:t>
             </a:fld>
             <a:endParaRPr lang="en-US"/>
           </a:p>
@@ -8339,7 +8661,7 @@
           <a:p>
             <a:fld id="{C764DE79-268F-4C1A-8933-263129D2AF90}" type="datetimeFigureOut">
               <a:rPr lang="en-US" dirty="0"/>
-              <a:t>8/15/2025</a:t>
+              <a:t>9/4/2025</a:t>
             </a:fld>
             <a:endParaRPr lang="en-US"/>
           </a:p>
@@ -8507,7 +8829,7 @@
           <a:p>
             <a:fld id="{C764DE79-268F-4C1A-8933-263129D2AF90}" type="datetimeFigureOut">
               <a:rPr lang="en-US" dirty="0"/>
-              <a:t>8/15/2025</a:t>
+              <a:t>9/4/2025</a:t>
             </a:fld>
             <a:endParaRPr lang="en-US"/>
           </a:p>
@@ -8685,7 +9007,7 @@
           <a:p>
             <a:fld id="{C764DE79-268F-4C1A-8933-263129D2AF90}" type="datetimeFigureOut">
               <a:rPr lang="en-US" dirty="0"/>
-              <a:t>8/15/2025</a:t>
+              <a:t>9/4/2025</a:t>
             </a:fld>
             <a:endParaRPr lang="en-US"/>
           </a:p>
@@ -9451,7 +9773,7 @@
           <a:p>
             <a:fld id="{C764DE79-268F-4C1A-8933-263129D2AF90}" type="datetimeFigureOut">
               <a:rPr lang="en-US" dirty="0"/>
-              <a:t>8/15/2025</a:t>
+              <a:t>9/4/2025</a:t>
             </a:fld>
             <a:endParaRPr lang="en-US"/>
           </a:p>
@@ -9696,7 +10018,7 @@
           <a:p>
             <a:fld id="{C764DE79-268F-4C1A-8933-263129D2AF90}" type="datetimeFigureOut">
               <a:rPr lang="en-US" dirty="0"/>
-              <a:t>8/15/2025</a:t>
+              <a:t>9/4/2025</a:t>
             </a:fld>
             <a:endParaRPr lang="en-US"/>
           </a:p>
@@ -9925,7 +10247,7 @@
           <a:p>
             <a:fld id="{C764DE79-268F-4C1A-8933-263129D2AF90}" type="datetimeFigureOut">
               <a:rPr lang="en-US" dirty="0"/>
-              <a:t>8/15/2025</a:t>
+              <a:t>9/4/2025</a:t>
             </a:fld>
             <a:endParaRPr lang="en-US"/>
           </a:p>
@@ -10289,7 +10611,7 @@
           <a:p>
             <a:fld id="{C764DE79-268F-4C1A-8933-263129D2AF90}" type="datetimeFigureOut">
               <a:rPr lang="en-US" dirty="0"/>
-              <a:t>8/15/2025</a:t>
+              <a:t>9/4/2025</a:t>
             </a:fld>
             <a:endParaRPr lang="en-US"/>
           </a:p>
@@ -10406,7 +10728,7 @@
           <a:p>
             <a:fld id="{C764DE79-268F-4C1A-8933-263129D2AF90}" type="datetimeFigureOut">
               <a:rPr lang="en-US" dirty="0"/>
-              <a:t>8/15/2025</a:t>
+              <a:t>9/4/2025</a:t>
             </a:fld>
             <a:endParaRPr lang="en-US"/>
           </a:p>
@@ -10501,7 +10823,7 @@
           <a:p>
             <a:fld id="{C764DE79-268F-4C1A-8933-263129D2AF90}" type="datetimeFigureOut">
               <a:rPr lang="en-US" dirty="0"/>
-              <a:t>8/15/2025</a:t>
+              <a:t>9/4/2025</a:t>
             </a:fld>
             <a:endParaRPr lang="en-US"/>
           </a:p>
@@ -10776,7 +11098,7 @@
           <a:p>
             <a:fld id="{C764DE79-268F-4C1A-8933-263129D2AF90}" type="datetimeFigureOut">
               <a:rPr lang="en-US" dirty="0"/>
-              <a:t>8/15/2025</a:t>
+              <a:t>9/4/2025</a:t>
             </a:fld>
             <a:endParaRPr lang="en-US"/>
           </a:p>
@@ -11028,7 +11350,7 @@
           <a:p>
             <a:fld id="{C764DE79-268F-4C1A-8933-263129D2AF90}" type="datetimeFigureOut">
               <a:rPr lang="en-US" dirty="0"/>
-              <a:t>8/15/2025</a:t>
+              <a:t>9/4/2025</a:t>
             </a:fld>
             <a:endParaRPr lang="en-US"/>
           </a:p>
@@ -11239,7 +11561,7 @@
           <a:p>
             <a:fld id="{C764DE79-268F-4C1A-8933-263129D2AF90}" type="datetimeFigureOut">
               <a:rPr lang="en-US" dirty="0"/>
-              <a:t>8/15/2025</a:t>
+              <a:t>9/4/2025</a:t>
             </a:fld>
             <a:endParaRPr lang="en-US"/>
           </a:p>
@@ -16139,6 +16461,130 @@
           <p:cNvPr id="2" name="Title 1">
             <a:extLst>
               <a:ext uri="{FF2B5EF4-FFF2-40B4-BE49-F238E27FC236}">
+                <a16:creationId xmlns:a16="http://schemas.microsoft.com/office/drawing/2014/main" id="{4F68A945-E91D-885B-40B6-93D7A4A089C0}"/>
+              </a:ext>
+            </a:extLst>
+          </p:cNvPr>
+          <p:cNvSpPr>
+            <a:spLocks noGrp="1"/>
+          </p:cNvSpPr>
+          <p:nvPr>
+            <p:ph type="title"/>
+          </p:nvPr>
+        </p:nvSpPr>
+        <p:spPr/>
+        <p:txBody>
+          <a:bodyPr/>
+          <a:lstStyle/>
+          <a:p>
+            <a:r>
+              <a:rPr lang="en-US" dirty="0"/>
+              <a:t>Resources</a:t>
+            </a:r>
+          </a:p>
+        </p:txBody>
+      </p:sp>
+      <p:sp>
+        <p:nvSpPr>
+          <p:cNvPr id="3" name="Content Placeholder 2">
+            <a:extLst>
+              <a:ext uri="{FF2B5EF4-FFF2-40B4-BE49-F238E27FC236}">
+                <a16:creationId xmlns:a16="http://schemas.microsoft.com/office/drawing/2014/main" id="{C3AA3F13-AF57-351D-5723-83B428D4D573}"/>
+              </a:ext>
+            </a:extLst>
+          </p:cNvPr>
+          <p:cNvSpPr>
+            <a:spLocks noGrp="1"/>
+          </p:cNvSpPr>
+          <p:nvPr>
+            <p:ph idx="1"/>
+          </p:nvPr>
+        </p:nvSpPr>
+        <p:spPr/>
+        <p:txBody>
+          <a:bodyPr/>
+          <a:lstStyle/>
+          <a:p>
+            <a:r>
+              <a:rPr lang="en-US" dirty="0"/>
+              <a:t>Python: </a:t>
+            </a:r>
+            <a:r>
+              <a:rPr lang="en-US" dirty="0">
+                <a:hlinkClick r:id="rId3"/>
+              </a:rPr>
+              <a:t>semantic-</a:t>
+            </a:r>
+            <a:r>
+              <a:rPr lang="en-US" dirty="0" err="1">
+                <a:hlinkClick r:id="rId3"/>
+              </a:rPr>
+              <a:t>kernel_multi</a:t>
+            </a:r>
+            <a:r>
+              <a:rPr lang="en-US" dirty="0">
+                <a:hlinkClick r:id="rId3"/>
+              </a:rPr>
+              <a:t>-agent-orchestration </a:t>
+            </a:r>
+            <a:endParaRPr lang="en-US" dirty="0"/>
+          </a:p>
+          <a:p>
+            <a:r>
+              <a:rPr lang="en-US" dirty="0"/>
+              <a:t>.NET: </a:t>
+            </a:r>
+            <a:r>
+              <a:rPr lang="en-US" dirty="0">
+                <a:hlinkClick r:id="rId4"/>
+              </a:rPr>
+              <a:t>semantic-</a:t>
+            </a:r>
+            <a:r>
+              <a:rPr lang="en-US" dirty="0" err="1">
+                <a:hlinkClick r:id="rId4"/>
+              </a:rPr>
+              <a:t>kernel_orchestration</a:t>
+            </a:r>
+            <a:endParaRPr lang="en-US" dirty="0"/>
+          </a:p>
+        </p:txBody>
+      </p:sp>
+    </p:spTree>
+    <p:extLst>
+      <p:ext uri="{BB962C8B-B14F-4D97-AF65-F5344CB8AC3E}">
+        <p14:creationId xmlns:p14="http://schemas.microsoft.com/office/powerpoint/2010/main" val="1632649127"/>
+      </p:ext>
+    </p:extLst>
+  </p:cSld>
+  <p:clrMapOvr>
+    <a:masterClrMapping/>
+  </p:clrMapOvr>
+</p:sld>
+</file>
+
+<file path=ppt/slides/slide24.xml><?xml version="1.0" encoding="utf-8"?>
+<p:sld xmlns:a="http://schemas.openxmlformats.org/drawingml/2006/main" xmlns:r="http://schemas.openxmlformats.org/officeDocument/2006/relationships" xmlns:p="http://schemas.openxmlformats.org/presentationml/2006/main">
+  <p:cSld>
+    <p:spTree>
+      <p:nvGrpSpPr>
+        <p:cNvPr id="1" name=""/>
+        <p:cNvGrpSpPr/>
+        <p:nvPr/>
+      </p:nvGrpSpPr>
+      <p:grpSpPr>
+        <a:xfrm>
+          <a:off x="0" y="0"/>
+          <a:ext cx="0" cy="0"/>
+          <a:chOff x="0" y="0"/>
+          <a:chExt cx="0" cy="0"/>
+        </a:xfrm>
+      </p:grpSpPr>
+      <p:sp>
+        <p:nvSpPr>
+          <p:cNvPr id="2" name="Title 1">
+            <a:extLst>
+              <a:ext uri="{FF2B5EF4-FFF2-40B4-BE49-F238E27FC236}">
                 <a16:creationId xmlns:a16="http://schemas.microsoft.com/office/drawing/2014/main" id="{318099B6-93BA-4E3A-7FA8-CC3C879CE5A4}"/>
               </a:ext>
             </a:extLst>
@@ -16356,7 +16802,7 @@
 </p:sld>
 </file>
 
-<file path=ppt/slides/slide24.xml><?xml version="1.0" encoding="utf-8"?>
+<file path=ppt/slides/slide25.xml><?xml version="1.0" encoding="utf-8"?>
 <p:sld xmlns:a="http://schemas.openxmlformats.org/drawingml/2006/main" xmlns:r="http://schemas.openxmlformats.org/officeDocument/2006/relationships" xmlns:p="http://schemas.openxmlformats.org/presentationml/2006/main" show="0">
   <p:cSld>
     <p:bg>
@@ -17078,7 +17524,7 @@
 </p:sld>
 </file>
 
-<file path=ppt/slides/slide25.xml><?xml version="1.0" encoding="utf-8"?>
+<file path=ppt/slides/slide26.xml><?xml version="1.0" encoding="utf-8"?>
 <p:sld xmlns:a="http://schemas.openxmlformats.org/drawingml/2006/main" xmlns:r="http://schemas.openxmlformats.org/officeDocument/2006/relationships" xmlns:p="http://schemas.openxmlformats.org/presentationml/2006/main">
   <p:cSld>
     <p:spTree>
@@ -17234,7 +17680,7 @@
 </p:sld>
 </file>
 
-<file path=ppt/slides/slide26.xml><?xml version="1.0" encoding="utf-8"?>
+<file path=ppt/slides/slide27.xml><?xml version="1.0" encoding="utf-8"?>
 <p:sld xmlns:a="http://schemas.openxmlformats.org/drawingml/2006/main" xmlns:r="http://schemas.openxmlformats.org/officeDocument/2006/relationships" xmlns:p="http://schemas.openxmlformats.org/presentationml/2006/main">
   <p:cSld>
     <p:spTree>
@@ -17511,7 +17957,7 @@
 </p:sld>
 </file>
 
-<file path=ppt/slides/slide27.xml><?xml version="1.0" encoding="utf-8"?>
+<file path=ppt/slides/slide28.xml><?xml version="1.0" encoding="utf-8"?>
 <p:sld xmlns:a="http://schemas.openxmlformats.org/drawingml/2006/main" xmlns:r="http://schemas.openxmlformats.org/officeDocument/2006/relationships" xmlns:p="http://schemas.openxmlformats.org/presentationml/2006/main">
   <p:cSld>
     <p:spTree>
@@ -22760,15 +23206,6 @@
 </file>
 
 <file path=customXml/item1.xml><?xml version="1.0" encoding="utf-8"?>
-<?mso-contentType ?>
-<FormTemplates xmlns="http://schemas.microsoft.com/sharepoint/v3/contenttype/forms">
-  <Display>DocumentLibraryForm</Display>
-  <Edit>DocumentLibraryForm</Edit>
-  <New>DocumentLibraryForm</New>
-</FormTemplates>
-</file>
-
-<file path=customXml/item2.xml><?xml version="1.0" encoding="utf-8"?>
 <ct:contentTypeSchema xmlns:ct="http://schemas.microsoft.com/office/2006/metadata/contentType" xmlns:ma="http://schemas.microsoft.com/office/2006/metadata/properties/metaAttributes" ct:_="" ma:_="" ma:contentTypeName="Document" ma:contentTypeID="0x0101000756EE98056A7042AEA0138604B6B8B2" ma:contentTypeVersion="12" ma:contentTypeDescription="Create a new document." ma:contentTypeScope="" ma:versionID="3555b970d01a506a88ebfd1885cc72d1">
   <xsd:schema xmlns:xsd="http://www.w3.org/2001/XMLSchema" xmlns:xs="http://www.w3.org/2001/XMLSchema" xmlns:p="http://schemas.microsoft.com/office/2006/metadata/properties" xmlns:ns1="http://schemas.microsoft.com/sharepoint/v3" xmlns:ns2="3272eabf-35b8-4d32-bfbe-f11cd1a88032" targetNamespace="http://schemas.microsoft.com/office/2006/metadata/properties" ma:root="true" ma:fieldsID="8c6612c840144a5f5e89b3d67a4d5a1d" ns1:_="" ns2:_="">
     <xsd:import namespace="http://schemas.microsoft.com/sharepoint/v3"/>
@@ -22967,6 +23404,15 @@
 </ct:contentTypeSchema>
 </file>
 
+<file path=customXml/item2.xml><?xml version="1.0" encoding="utf-8"?>
+<?mso-contentType ?>
+<FormTemplates xmlns="http://schemas.microsoft.com/sharepoint/v3/contenttype/forms">
+  <Display>DocumentLibraryForm</Display>
+  <Edit>DocumentLibraryForm</Edit>
+  <New>DocumentLibraryForm</New>
+</FormTemplates>
+</file>
+
 <file path=customXml/item3.xml><?xml version="1.0" encoding="utf-8"?>
 <p:properties xmlns:p="http://schemas.microsoft.com/office/2006/metadata/properties" xmlns:xsi="http://www.w3.org/2001/XMLSchema-instance" xmlns:pc="http://schemas.microsoft.com/office/infopath/2007/PartnerControls">
   <documentManagement>
@@ -22977,14 +23423,6 @@
 </file>
 
 <file path=customXml/itemProps1.xml><?xml version="1.0" encoding="utf-8"?>
-<ds:datastoreItem xmlns:ds="http://schemas.openxmlformats.org/officeDocument/2006/customXml" ds:itemID="{24A262B7-753B-4176-B230-9730EE1D661B}">
-  <ds:schemaRefs>
-    <ds:schemaRef ds:uri="http://schemas.microsoft.com/sharepoint/v3/contenttype/forms"/>
-  </ds:schemaRefs>
-</ds:datastoreItem>
-</file>
-
-<file path=customXml/itemProps2.xml><?xml version="1.0" encoding="utf-8"?>
 <ds:datastoreItem xmlns:ds="http://schemas.openxmlformats.org/officeDocument/2006/customXml" ds:itemID="{0E68C007-6054-4547-86D6-A1931F868ACD}">
   <ds:schemaRefs>
     <ds:schemaRef ds:uri="http://schemas.microsoft.com/office/2006/metadata/contentType"/>
@@ -22999,6 +23437,14 @@
     <ds:schemaRef ds:uri="http://purl.org/dc/elements/1.1/"/>
     <ds:schemaRef ds:uri="http://purl.org/dc/terms/"/>
     <ds:schemaRef ds:uri="http://schemas.microsoft.com/internal/obd"/>
+  </ds:schemaRefs>
+</ds:datastoreItem>
+</file>
+
+<file path=customXml/itemProps2.xml><?xml version="1.0" encoding="utf-8"?>
+<ds:datastoreItem xmlns:ds="http://schemas.openxmlformats.org/officeDocument/2006/customXml" ds:itemID="{24A262B7-753B-4176-B230-9730EE1D661B}">
+  <ds:schemaRefs>
+    <ds:schemaRef ds:uri="http://schemas.microsoft.com/sharepoint/v3/contenttype/forms"/>
   </ds:schemaRefs>
 </ds:datastoreItem>
 </file>

</xml_diff>

<commit_message>
Hid the last two slides.
</commit_message>
<xml_diff>
--- a/Semantic Kernel Overview.pptx
+++ b/Semantic Kernel Overview.pptx
@@ -227,7 +227,7 @@
   <pc:docChgLst>
     <pc:chgData name="Brian Spann" userId="df82fc38-8cec-41fc-a104-d1b358af507b" providerId="ADAL" clId="{9AA94F94-A085-4185-863A-1DA613957B12}"/>
     <pc:docChg chg="custSel addSld delSld modSld sldOrd modSection">
-      <pc:chgData name="Brian Spann" userId="df82fc38-8cec-41fc-a104-d1b358af507b" providerId="ADAL" clId="{9AA94F94-A085-4185-863A-1DA613957B12}" dt="2025-09-12T18:07:34.118" v="4525" actId="2696"/>
+      <pc:chgData name="Brian Spann" userId="df82fc38-8cec-41fc-a104-d1b358af507b" providerId="ADAL" clId="{9AA94F94-A085-4185-863A-1DA613957B12}" dt="2025-09-12T18:12:04.170" v="4527" actId="729"/>
       <pc:docMkLst>
         <pc:docMk/>
       </pc:docMkLst>
@@ -281,8 +281,8 @@
           <pc:sldMk cId="3174830760" sldId="265"/>
         </pc:sldMkLst>
       </pc:sldChg>
-      <pc:sldChg chg="modNotesTx">
-        <pc:chgData name="Brian Spann" userId="df82fc38-8cec-41fc-a104-d1b358af507b" providerId="ADAL" clId="{9AA94F94-A085-4185-863A-1DA613957B12}" dt="2025-08-19T02:57:15.294" v="4" actId="20577"/>
+      <pc:sldChg chg="mod modShow modNotesTx">
+        <pc:chgData name="Brian Spann" userId="df82fc38-8cec-41fc-a104-d1b358af507b" providerId="ADAL" clId="{9AA94F94-A085-4185-863A-1DA613957B12}" dt="2025-09-12T18:12:00.463" v="4526" actId="729"/>
         <pc:sldMkLst>
           <pc:docMk/>
           <pc:sldMk cId="324410477" sldId="266"/>
@@ -316,8 +316,8 @@
           <pc:sldMk cId="446473764" sldId="2147480871"/>
         </pc:sldMkLst>
       </pc:sldChg>
-      <pc:sldChg chg="modNotesTx">
-        <pc:chgData name="Brian Spann" userId="df82fc38-8cec-41fc-a104-d1b358af507b" providerId="ADAL" clId="{9AA94F94-A085-4185-863A-1DA613957B12}" dt="2025-08-19T02:58:57.171" v="10" actId="20577"/>
+      <pc:sldChg chg="mod modShow modNotesTx">
+        <pc:chgData name="Brian Spann" userId="df82fc38-8cec-41fc-a104-d1b358af507b" providerId="ADAL" clId="{9AA94F94-A085-4185-863A-1DA613957B12}" dt="2025-09-12T18:12:04.170" v="4527" actId="729"/>
         <pc:sldMkLst>
           <pc:docMk/>
           <pc:sldMk cId="3388496941" sldId="2147480872"/>
@@ -27074,7 +27074,7 @@
 </file>
 
 <file path=ppt/slides/slide37.xml><?xml version="1.0" encoding="utf-8"?>
-<p:sld xmlns:a="http://schemas.openxmlformats.org/drawingml/2006/main" xmlns:r="http://schemas.openxmlformats.org/officeDocument/2006/relationships" xmlns:p="http://schemas.openxmlformats.org/presentationml/2006/main">
+<p:sld xmlns:a="http://schemas.openxmlformats.org/drawingml/2006/main" xmlns:r="http://schemas.openxmlformats.org/officeDocument/2006/relationships" xmlns:p="http://schemas.openxmlformats.org/presentationml/2006/main" show="0">
   <p:cSld>
     <p:spTree>
       <p:nvGrpSpPr>
@@ -27351,7 +27351,7 @@
 </file>
 
 <file path=ppt/slides/slide38.xml><?xml version="1.0" encoding="utf-8"?>
-<p:sld xmlns:a="http://schemas.openxmlformats.org/drawingml/2006/main" xmlns:r="http://schemas.openxmlformats.org/officeDocument/2006/relationships" xmlns:p="http://schemas.openxmlformats.org/presentationml/2006/main">
+<p:sld xmlns:a="http://schemas.openxmlformats.org/drawingml/2006/main" xmlns:r="http://schemas.openxmlformats.org/officeDocument/2006/relationships" xmlns:p="http://schemas.openxmlformats.org/presentationml/2006/main" show="0">
   <p:cSld>
     <p:spTree>
       <p:nvGrpSpPr>
@@ -30408,6 +30408,24 @@
 </file>
 
 <file path=customXml/item1.xml><?xml version="1.0" encoding="utf-8"?>
+<?mso-contentType ?>
+<FormTemplates xmlns="http://schemas.microsoft.com/sharepoint/v3/contenttype/forms">
+  <Display>DocumentLibraryForm</Display>
+  <Edit>DocumentLibraryForm</Edit>
+  <New>DocumentLibraryForm</New>
+</FormTemplates>
+</file>
+
+<file path=customXml/item2.xml><?xml version="1.0" encoding="utf-8"?>
+<p:properties xmlns:p="http://schemas.microsoft.com/office/2006/metadata/properties" xmlns:xsi="http://www.w3.org/2001/XMLSchema-instance" xmlns:pc="http://schemas.microsoft.com/office/infopath/2007/PartnerControls">
+  <documentManagement>
+    <_ip_UnifiedCompliancePolicyUIAction xmlns="http://schemas.microsoft.com/sharepoint/v3" xsi:nil="true"/>
+    <_ip_UnifiedCompliancePolicyProperties xmlns="http://schemas.microsoft.com/sharepoint/v3" xsi:nil="true"/>
+  </documentManagement>
+</p:properties>
+</file>
+
+<file path=customXml/item3.xml><?xml version="1.0" encoding="utf-8"?>
 <ct:contentTypeSchema xmlns:ct="http://schemas.microsoft.com/office/2006/metadata/contentType" xmlns:ma="http://schemas.microsoft.com/office/2006/metadata/properties/metaAttributes" ct:_="" ma:_="" ma:contentTypeName="Document" ma:contentTypeID="0x0101000756EE98056A7042AEA0138604B6B8B2" ma:contentTypeVersion="12" ma:contentTypeDescription="Create a new document." ma:contentTypeScope="" ma:versionID="3555b970d01a506a88ebfd1885cc72d1">
   <xsd:schema xmlns:xsd="http://www.w3.org/2001/XMLSchema" xmlns:xs="http://www.w3.org/2001/XMLSchema" xmlns:p="http://schemas.microsoft.com/office/2006/metadata/properties" xmlns:ns1="http://schemas.microsoft.com/sharepoint/v3" xmlns:ns2="3272eabf-35b8-4d32-bfbe-f11cd1a88032" targetNamespace="http://schemas.microsoft.com/office/2006/metadata/properties" ma:root="true" ma:fieldsID="8c6612c840144a5f5e89b3d67a4d5a1d" ns1:_="" ns2:_="">
     <xsd:import namespace="http://schemas.microsoft.com/sharepoint/v3"/>
@@ -30606,25 +30624,32 @@
 </ct:contentTypeSchema>
 </file>
 
-<file path=customXml/item2.xml><?xml version="1.0" encoding="utf-8"?>
-<?mso-contentType ?>
-<FormTemplates xmlns="http://schemas.microsoft.com/sharepoint/v3/contenttype/forms">
-  <Display>DocumentLibraryForm</Display>
-  <Edit>DocumentLibraryForm</Edit>
-  <New>DocumentLibraryForm</New>
-</FormTemplates>
+<file path=customXml/itemProps1.xml><?xml version="1.0" encoding="utf-8"?>
+<ds:datastoreItem xmlns:ds="http://schemas.openxmlformats.org/officeDocument/2006/customXml" ds:itemID="{24A262B7-753B-4176-B230-9730EE1D661B}">
+  <ds:schemaRefs>
+    <ds:schemaRef ds:uri="http://schemas.microsoft.com/sharepoint/v3/contenttype/forms"/>
+  </ds:schemaRefs>
+</ds:datastoreItem>
 </file>
 
-<file path=customXml/item3.xml><?xml version="1.0" encoding="utf-8"?>
-<p:properties xmlns:p="http://schemas.microsoft.com/office/2006/metadata/properties" xmlns:xsi="http://www.w3.org/2001/XMLSchema-instance" xmlns:pc="http://schemas.microsoft.com/office/infopath/2007/PartnerControls">
-  <documentManagement>
-    <_ip_UnifiedCompliancePolicyUIAction xmlns="http://schemas.microsoft.com/sharepoint/v3" xsi:nil="true"/>
-    <_ip_UnifiedCompliancePolicyProperties xmlns="http://schemas.microsoft.com/sharepoint/v3" xsi:nil="true"/>
-  </documentManagement>
-</p:properties>
+<file path=customXml/itemProps2.xml><?xml version="1.0" encoding="utf-8"?>
+<ds:datastoreItem xmlns:ds="http://schemas.openxmlformats.org/officeDocument/2006/customXml" ds:itemID="{105AC48B-61CB-4EEF-BF10-079E68C5FA34}">
+  <ds:schemaRefs>
+    <ds:schemaRef ds:uri="3272eabf-35b8-4d32-bfbe-f11cd1a88032"/>
+    <ds:schemaRef ds:uri="http://purl.org/dc/elements/1.1/"/>
+    <ds:schemaRef ds:uri="http://schemas.microsoft.com/office/2006/metadata/properties"/>
+    <ds:schemaRef ds:uri="http://schemas.microsoft.com/office/infopath/2007/PartnerControls"/>
+    <ds:schemaRef ds:uri="http://schemas.microsoft.com/office/2006/documentManagement/types"/>
+    <ds:schemaRef ds:uri="http://purl.org/dc/terms/"/>
+    <ds:schemaRef ds:uri="http://schemas.openxmlformats.org/package/2006/metadata/core-properties"/>
+    <ds:schemaRef ds:uri="http://www.w3.org/XML/1998/namespace"/>
+    <ds:schemaRef ds:uri="http://schemas.microsoft.com/sharepoint/v3"/>
+    <ds:schemaRef ds:uri="http://purl.org/dc/dcmitype/"/>
+  </ds:schemaRefs>
+</ds:datastoreItem>
 </file>
 
-<file path=customXml/itemProps1.xml><?xml version="1.0" encoding="utf-8"?>
+<file path=customXml/itemProps3.xml><?xml version="1.0" encoding="utf-8"?>
 <ds:datastoreItem xmlns:ds="http://schemas.openxmlformats.org/officeDocument/2006/customXml" ds:itemID="{0E68C007-6054-4547-86D6-A1931F868ACD}">
   <ds:schemaRefs>
     <ds:schemaRef ds:uri="http://schemas.microsoft.com/office/2006/metadata/contentType"/>
@@ -30643,31 +30668,6 @@
 </ds:datastoreItem>
 </file>
 
-<file path=customXml/itemProps2.xml><?xml version="1.0" encoding="utf-8"?>
-<ds:datastoreItem xmlns:ds="http://schemas.openxmlformats.org/officeDocument/2006/customXml" ds:itemID="{24A262B7-753B-4176-B230-9730EE1D661B}">
-  <ds:schemaRefs>
-    <ds:schemaRef ds:uri="http://schemas.microsoft.com/sharepoint/v3/contenttype/forms"/>
-  </ds:schemaRefs>
-</ds:datastoreItem>
-</file>
-
-<file path=customXml/itemProps3.xml><?xml version="1.0" encoding="utf-8"?>
-<ds:datastoreItem xmlns:ds="http://schemas.openxmlformats.org/officeDocument/2006/customXml" ds:itemID="{105AC48B-61CB-4EEF-BF10-079E68C5FA34}">
-  <ds:schemaRefs>
-    <ds:schemaRef ds:uri="3272eabf-35b8-4d32-bfbe-f11cd1a88032"/>
-    <ds:schemaRef ds:uri="http://purl.org/dc/elements/1.1/"/>
-    <ds:schemaRef ds:uri="http://schemas.microsoft.com/office/2006/metadata/properties"/>
-    <ds:schemaRef ds:uri="http://schemas.microsoft.com/office/infopath/2007/PartnerControls"/>
-    <ds:schemaRef ds:uri="http://schemas.microsoft.com/office/2006/documentManagement/types"/>
-    <ds:schemaRef ds:uri="http://purl.org/dc/terms/"/>
-    <ds:schemaRef ds:uri="http://schemas.openxmlformats.org/package/2006/metadata/core-properties"/>
-    <ds:schemaRef ds:uri="http://www.w3.org/XML/1998/namespace"/>
-    <ds:schemaRef ds:uri="http://schemas.microsoft.com/sharepoint/v3"/>
-    <ds:schemaRef ds:uri="http://purl.org/dc/dcmitype/"/>
-  </ds:schemaRefs>
-</ds:datastoreItem>
-</file>
-
 <file path=docMetadata/LabelInfo.xml><?xml version="1.0" encoding="utf-8"?>
 <clbl:labelList xmlns:clbl="http://schemas.microsoft.com/office/2020/mipLabelMetadata">
   <clbl:label id="{f42aa342-8706-4288-bd11-ebb85995028c}" enabled="1" method="Privileged" siteId="{72f988bf-86f1-41af-91ab-2d7cd011db47}" removed="0"/>

</xml_diff>